<commit_message>
finish land methodology graphic
</commit_message>
<xml_diff>
--- a/images/Land_Methodology_Flow_Diagrams.pptx
+++ b/images/Land_Methodology_Flow_Diagrams.pptx
@@ -3779,8 +3779,8 @@
         </p:nvSpPr>
         <p:spPr>
           <a:xfrm>
-            <a:off x="4142815" y="1308464"/>
-            <a:ext cx="1200936" cy="1298329"/>
+            <a:off x="36639" y="1290590"/>
+            <a:ext cx="1287066" cy="1098306"/>
           </a:xfrm>
           <a:prstGeom prst="roundRect">
             <a:avLst/>
@@ -3837,8 +3837,8 @@
         </p:nvSpPr>
         <p:spPr>
           <a:xfrm>
-            <a:off x="2786561" y="1308465"/>
-            <a:ext cx="1200936" cy="1298329"/>
+            <a:off x="8149715" y="1304873"/>
+            <a:ext cx="1287066" cy="1098306"/>
           </a:xfrm>
           <a:prstGeom prst="roundRect">
             <a:avLst/>
@@ -3876,7 +3876,7 @@
             <a:pPr algn="ctr"/>
             <a:r>
               <a:rPr lang="en-US" sz="1200" dirty="0"/>
-              <a:t>Cropland used for pasture, Forest-use land grazed, grassland pasture and range</a:t>
+              <a:t>Cropland for pasture, Forest-use land grazed, grassland pasture and range</a:t>
             </a:r>
           </a:p>
         </p:txBody>
@@ -3895,8 +3895,8 @@
         </p:nvSpPr>
         <p:spPr>
           <a:xfrm>
-            <a:off x="6855303" y="1299752"/>
-            <a:ext cx="1200936" cy="1298329"/>
+            <a:off x="2744922" y="1305152"/>
+            <a:ext cx="1287066" cy="1098306"/>
           </a:xfrm>
           <a:prstGeom prst="roundRect">
             <a:avLst/>
@@ -3953,8 +3953,8 @@
         </p:nvSpPr>
         <p:spPr>
           <a:xfrm>
-            <a:off x="9562625" y="1304676"/>
-            <a:ext cx="1200936" cy="1298329"/>
+            <a:off x="5449838" y="1285965"/>
+            <a:ext cx="1287066" cy="1098306"/>
           </a:xfrm>
           <a:prstGeom prst="roundRect">
             <a:avLst/>
@@ -4011,8 +4011,8 @@
         </p:nvSpPr>
         <p:spPr>
           <a:xfrm>
-            <a:off x="10919728" y="1310672"/>
-            <a:ext cx="1200936" cy="1298329"/>
+            <a:off x="6800776" y="1293102"/>
+            <a:ext cx="1287066" cy="1098306"/>
           </a:xfrm>
           <a:prstGeom prst="roundRect">
             <a:avLst/>
@@ -4069,8 +4069,8 @@
         </p:nvSpPr>
         <p:spPr>
           <a:xfrm>
-            <a:off x="8208964" y="1308464"/>
-            <a:ext cx="1200936" cy="1298329"/>
+            <a:off x="4096684" y="1300241"/>
+            <a:ext cx="1287066" cy="1098306"/>
           </a:xfrm>
           <a:prstGeom prst="roundRect">
             <a:avLst/>
@@ -4127,8 +4127,8 @@
         </p:nvSpPr>
         <p:spPr>
           <a:xfrm>
-            <a:off x="1427658" y="1301511"/>
-            <a:ext cx="1200936" cy="1298329"/>
+            <a:off x="9501472" y="1300241"/>
+            <a:ext cx="1287066" cy="1098306"/>
           </a:xfrm>
           <a:prstGeom prst="roundRect">
             <a:avLst/>
@@ -4185,8 +4185,8 @@
         </p:nvSpPr>
         <p:spPr>
           <a:xfrm>
-            <a:off x="5498187" y="1300693"/>
-            <a:ext cx="1200936" cy="1298329"/>
+            <a:off x="1392592" y="1305152"/>
+            <a:ext cx="1287066" cy="1098306"/>
           </a:xfrm>
           <a:prstGeom prst="roundRect">
             <a:avLst/>
@@ -4313,19 +4313,17 @@
           <p:cNvCxnSpPr>
             <a:cxnSpLocks/>
             <a:stCxn id="16" idx="2"/>
-            <a:endCxn id="559" idx="0"/>
+            <a:endCxn id="559" idx="1"/>
           </p:cNvCxnSpPr>
           <p:nvPr/>
         </p:nvCxnSpPr>
         <p:spPr>
-          <a:xfrm rot="5400000">
-            <a:off x="1997563" y="3250409"/>
-            <a:ext cx="3389336" cy="2102104"/>
-          </a:xfrm>
-          <a:prstGeom prst="bentConnector3">
-            <a:avLst>
-              <a:gd name="adj1" fmla="val 50000"/>
-            </a:avLst>
+          <a:xfrm rot="16200000" flipH="1">
+            <a:off x="-919406" y="3988473"/>
+            <a:ext cx="3944627" cy="745471"/>
+          </a:xfrm>
+          <a:prstGeom prst="bentConnector2">
+            <a:avLst/>
           </a:prstGeom>
           <a:ln>
             <a:solidFill>
@@ -4361,18 +4359,18 @@
           <p:cNvCxnSpPr>
             <a:cxnSpLocks/>
             <a:stCxn id="17" idx="2"/>
-            <a:endCxn id="559" idx="0"/>
+            <a:endCxn id="252" idx="0"/>
           </p:cNvCxnSpPr>
           <p:nvPr/>
         </p:nvCxnSpPr>
         <p:spPr>
-          <a:xfrm rot="5400000">
-            <a:off x="1319437" y="3928536"/>
-            <a:ext cx="3389335" cy="745850"/>
+          <a:xfrm rot="16200000" flipH="1">
+            <a:off x="8137114" y="3059312"/>
+            <a:ext cx="2155083" cy="842815"/>
           </a:xfrm>
           <a:prstGeom prst="bentConnector3">
             <a:avLst>
-              <a:gd name="adj1" fmla="val 50000"/>
+              <a:gd name="adj1" fmla="val 77501"/>
             </a:avLst>
           </a:prstGeom>
           <a:ln>
@@ -4468,14 +4466,160 @@
           <p:cNvCxnSpPr>
             <a:cxnSpLocks/>
             <a:stCxn id="23" idx="2"/>
-            <a:endCxn id="559" idx="0"/>
+            <a:endCxn id="227" idx="0"/>
           </p:cNvCxnSpPr>
           <p:nvPr/>
         </p:nvCxnSpPr>
         <p:spPr>
           <a:xfrm rot="16200000" flipH="1">
-            <a:off x="636508" y="3991457"/>
-            <a:ext cx="3396289" cy="613053"/>
+            <a:off x="8454846" y="4088705"/>
+            <a:ext cx="3696421" cy="316103"/>
+          </a:xfrm>
+          <a:prstGeom prst="bentConnector3">
+            <a:avLst>
+              <a:gd name="adj1" fmla="val 52801"/>
+            </a:avLst>
+          </a:prstGeom>
+          <a:ln>
+            <a:solidFill>
+              <a:schemeClr val="tx1"/>
+            </a:solidFill>
+            <a:tailEnd type="triangle"/>
+          </a:ln>
+        </p:spPr>
+        <p:style>
+          <a:lnRef idx="1">
+            <a:schemeClr val="accent1"/>
+          </a:lnRef>
+          <a:fillRef idx="0">
+            <a:schemeClr val="accent1"/>
+          </a:fillRef>
+          <a:effectRef idx="0">
+            <a:schemeClr val="accent1"/>
+          </a:effectRef>
+          <a:fontRef idx="minor">
+            <a:schemeClr val="tx1"/>
+          </a:fontRef>
+        </p:style>
+      </p:cxnSp>
+      <p:cxnSp>
+        <p:nvCxnSpPr>
+          <p:cNvPr id="543" name="Connector: Elbow 542">
+            <a:extLst>
+              <a:ext uri="{FF2B5EF4-FFF2-40B4-BE49-F238E27FC236}">
+                <a16:creationId xmlns:a16="http://schemas.microsoft.com/office/drawing/2014/main" id="{04919369-A442-4D90-B575-7C2584E3C160}"/>
+              </a:ext>
+            </a:extLst>
+          </p:cNvPr>
+          <p:cNvCxnSpPr>
+            <a:cxnSpLocks/>
+            <a:stCxn id="19" idx="2"/>
+            <a:endCxn id="559" idx="1"/>
+          </p:cNvCxnSpPr>
+          <p:nvPr/>
+        </p:nvCxnSpPr>
+        <p:spPr>
+          <a:xfrm rot="5400000">
+            <a:off x="442017" y="3387084"/>
+            <a:ext cx="3930065" cy="1962812"/>
+          </a:xfrm>
+          <a:prstGeom prst="bentConnector4">
+            <a:avLst>
+              <a:gd name="adj1" fmla="val 4224"/>
+              <a:gd name="adj2" fmla="val 138017"/>
+            </a:avLst>
+          </a:prstGeom>
+          <a:ln>
+            <a:solidFill>
+              <a:schemeClr val="tx1"/>
+            </a:solidFill>
+            <a:tailEnd type="triangle"/>
+          </a:ln>
+        </p:spPr>
+        <p:style>
+          <a:lnRef idx="1">
+            <a:schemeClr val="accent1"/>
+          </a:lnRef>
+          <a:fillRef idx="0">
+            <a:schemeClr val="accent1"/>
+          </a:fillRef>
+          <a:effectRef idx="0">
+            <a:schemeClr val="accent1"/>
+          </a:effectRef>
+          <a:fontRef idx="minor">
+            <a:schemeClr val="tx1"/>
+          </a:fontRef>
+        </p:style>
+      </p:cxnSp>
+      <p:cxnSp>
+        <p:nvCxnSpPr>
+          <p:cNvPr id="611" name="Connector: Elbow 610">
+            <a:extLst>
+              <a:ext uri="{FF2B5EF4-FFF2-40B4-BE49-F238E27FC236}">
+                <a16:creationId xmlns:a16="http://schemas.microsoft.com/office/drawing/2014/main" id="{25DB9225-96E4-46FC-B5EE-0117CEF8B518}"/>
+              </a:ext>
+            </a:extLst>
+          </p:cNvPr>
+          <p:cNvCxnSpPr>
+            <a:cxnSpLocks/>
+            <a:stCxn id="24" idx="2"/>
+            <a:endCxn id="559" idx="1"/>
+          </p:cNvCxnSpPr>
+          <p:nvPr/>
+        </p:nvCxnSpPr>
+        <p:spPr>
+          <a:xfrm rot="5400000">
+            <a:off x="-234148" y="4063249"/>
+            <a:ext cx="3930065" cy="610482"/>
+          </a:xfrm>
+          <a:prstGeom prst="bentConnector4">
+            <a:avLst>
+              <a:gd name="adj1" fmla="val 4223"/>
+              <a:gd name="adj2" fmla="val 222229"/>
+            </a:avLst>
+          </a:prstGeom>
+          <a:ln>
+            <a:solidFill>
+              <a:schemeClr val="tx1"/>
+            </a:solidFill>
+            <a:tailEnd type="triangle"/>
+          </a:ln>
+        </p:spPr>
+        <p:style>
+          <a:lnRef idx="1">
+            <a:schemeClr val="accent1"/>
+          </a:lnRef>
+          <a:fillRef idx="0">
+            <a:schemeClr val="accent1"/>
+          </a:fillRef>
+          <a:effectRef idx="0">
+            <a:schemeClr val="accent1"/>
+          </a:effectRef>
+          <a:fontRef idx="minor">
+            <a:schemeClr val="tx1"/>
+          </a:fontRef>
+        </p:style>
+      </p:cxnSp>
+      <p:cxnSp>
+        <p:nvCxnSpPr>
+          <p:cNvPr id="616" name="Connector: Elbow 615">
+            <a:extLst>
+              <a:ext uri="{FF2B5EF4-FFF2-40B4-BE49-F238E27FC236}">
+                <a16:creationId xmlns:a16="http://schemas.microsoft.com/office/drawing/2014/main" id="{1035C77E-9F34-4270-B04A-A7B3697AEB4A}"/>
+              </a:ext>
+            </a:extLst>
+          </p:cNvPr>
+          <p:cNvCxnSpPr>
+            <a:cxnSpLocks/>
+            <a:stCxn id="49" idx="2"/>
+            <a:endCxn id="16" idx="0"/>
+          </p:cNvCxnSpPr>
+          <p:nvPr/>
+        </p:nvCxnSpPr>
+        <p:spPr>
+          <a:xfrm rot="5400000">
+            <a:off x="3130574" y="-1671383"/>
+            <a:ext cx="511572" cy="5412375"/>
           </a:xfrm>
           <a:prstGeom prst="bentConnector3">
             <a:avLst>
@@ -4506,162 +4650,24 @@
       </p:cxnSp>
       <p:cxnSp>
         <p:nvCxnSpPr>
-          <p:cNvPr id="534" name="Connector: Elbow 533">
-            <a:extLst>
-              <a:ext uri="{FF2B5EF4-FFF2-40B4-BE49-F238E27FC236}">
-                <a16:creationId xmlns:a16="http://schemas.microsoft.com/office/drawing/2014/main" id="{55B00E7B-7CF0-4202-A683-C58CDAB4A183}"/>
+          <p:cNvPr id="619" name="Connector: Elbow 618">
+            <a:extLst>
+              <a:ext uri="{FF2B5EF4-FFF2-40B4-BE49-F238E27FC236}">
+                <a16:creationId xmlns:a16="http://schemas.microsoft.com/office/drawing/2014/main" id="{88264546-4774-4B75-B3A7-81BF74CC5551}"/>
               </a:ext>
             </a:extLst>
           </p:cNvPr>
           <p:cNvCxnSpPr>
             <a:cxnSpLocks/>
-            <a:stCxn id="20" idx="2"/>
-            <a:endCxn id="559" idx="3"/>
+            <a:stCxn id="49" idx="2"/>
+            <a:endCxn id="17" idx="0"/>
           </p:cNvCxnSpPr>
           <p:nvPr/>
         </p:nvCxnSpPr>
         <p:spPr>
-          <a:xfrm rot="5400000">
-            <a:off x="5144645" y="1315075"/>
-            <a:ext cx="3730518" cy="6306378"/>
-          </a:xfrm>
-          <a:prstGeom prst="bentConnector2">
-            <a:avLst/>
-          </a:prstGeom>
-          <a:ln>
-            <a:solidFill>
-              <a:schemeClr val="tx1"/>
-            </a:solidFill>
-            <a:tailEnd type="triangle"/>
-          </a:ln>
-        </p:spPr>
-        <p:style>
-          <a:lnRef idx="1">
-            <a:schemeClr val="accent1"/>
-          </a:lnRef>
-          <a:fillRef idx="0">
-            <a:schemeClr val="accent1"/>
-          </a:fillRef>
-          <a:effectRef idx="0">
-            <a:schemeClr val="accent1"/>
-          </a:effectRef>
-          <a:fontRef idx="minor">
-            <a:schemeClr val="tx1"/>
-          </a:fontRef>
-        </p:style>
-      </p:cxnSp>
-      <p:cxnSp>
-        <p:nvCxnSpPr>
-          <p:cNvPr id="543" name="Connector: Elbow 542">
-            <a:extLst>
-              <a:ext uri="{FF2B5EF4-FFF2-40B4-BE49-F238E27FC236}">
-                <a16:creationId xmlns:a16="http://schemas.microsoft.com/office/drawing/2014/main" id="{04919369-A442-4D90-B575-7C2584E3C160}"/>
-              </a:ext>
-            </a:extLst>
-          </p:cNvPr>
-          <p:cNvCxnSpPr>
-            <a:cxnSpLocks/>
-            <a:stCxn id="19" idx="2"/>
-            <a:endCxn id="559" idx="3"/>
-          </p:cNvCxnSpPr>
-          <p:nvPr/>
-        </p:nvCxnSpPr>
-        <p:spPr>
-          <a:xfrm rot="5400000">
-            <a:off x="3788522" y="2666274"/>
-            <a:ext cx="3735442" cy="3599056"/>
-          </a:xfrm>
-          <a:prstGeom prst="bentConnector2">
-            <a:avLst/>
-          </a:prstGeom>
-          <a:ln>
-            <a:solidFill>
-              <a:schemeClr val="tx1"/>
-            </a:solidFill>
-            <a:tailEnd type="triangle"/>
-          </a:ln>
-        </p:spPr>
-        <p:style>
-          <a:lnRef idx="1">
-            <a:schemeClr val="accent1"/>
-          </a:lnRef>
-          <a:fillRef idx="0">
-            <a:schemeClr val="accent1"/>
-          </a:fillRef>
-          <a:effectRef idx="0">
-            <a:schemeClr val="accent1"/>
-          </a:effectRef>
-          <a:fontRef idx="minor">
-            <a:schemeClr val="tx1"/>
-          </a:fontRef>
-        </p:style>
-      </p:cxnSp>
-      <p:cxnSp>
-        <p:nvCxnSpPr>
-          <p:cNvPr id="609" name="Connector: Elbow 608">
-            <a:extLst>
-              <a:ext uri="{FF2B5EF4-FFF2-40B4-BE49-F238E27FC236}">
-                <a16:creationId xmlns:a16="http://schemas.microsoft.com/office/drawing/2014/main" id="{51A5BDB1-F995-4383-B348-4E4718C6710A}"/>
-              </a:ext>
-            </a:extLst>
-          </p:cNvPr>
-          <p:cNvCxnSpPr>
-            <a:cxnSpLocks/>
-            <a:stCxn id="22" idx="2"/>
-            <a:endCxn id="559" idx="3"/>
-          </p:cNvCxnSpPr>
-          <p:nvPr/>
-        </p:nvCxnSpPr>
-        <p:spPr>
-          <a:xfrm rot="5400000">
-            <a:off x="4469709" y="1993800"/>
-            <a:ext cx="3726730" cy="4952717"/>
-          </a:xfrm>
-          <a:prstGeom prst="bentConnector2">
-            <a:avLst/>
-          </a:prstGeom>
-          <a:ln>
-            <a:solidFill>
-              <a:schemeClr val="tx1"/>
-            </a:solidFill>
-            <a:tailEnd type="triangle"/>
-          </a:ln>
-        </p:spPr>
-        <p:style>
-          <a:lnRef idx="1">
-            <a:schemeClr val="accent1"/>
-          </a:lnRef>
-          <a:fillRef idx="0">
-            <a:schemeClr val="accent1"/>
-          </a:fillRef>
-          <a:effectRef idx="0">
-            <a:schemeClr val="accent1"/>
-          </a:effectRef>
-          <a:fontRef idx="minor">
-            <a:schemeClr val="tx1"/>
-          </a:fontRef>
-        </p:style>
-      </p:cxnSp>
-      <p:cxnSp>
-        <p:nvCxnSpPr>
-          <p:cNvPr id="611" name="Connector: Elbow 610">
-            <a:extLst>
-              <a:ext uri="{FF2B5EF4-FFF2-40B4-BE49-F238E27FC236}">
-                <a16:creationId xmlns:a16="http://schemas.microsoft.com/office/drawing/2014/main" id="{25DB9225-96E4-46FC-B5EE-0117CEF8B518}"/>
-              </a:ext>
-            </a:extLst>
-          </p:cNvPr>
-          <p:cNvCxnSpPr>
-            <a:cxnSpLocks/>
-            <a:stCxn id="24" idx="2"/>
-            <a:endCxn id="559" idx="0"/>
-          </p:cNvCxnSpPr>
-          <p:nvPr/>
-        </p:nvCxnSpPr>
-        <p:spPr>
-          <a:xfrm rot="5400000">
-            <a:off x="2671364" y="2568837"/>
-            <a:ext cx="3397107" cy="3457476"/>
+          <a:xfrm rot="16200000" flipH="1">
+            <a:off x="7179970" y="-308406"/>
+            <a:ext cx="525855" cy="2700701"/>
           </a:xfrm>
           <a:prstGeom prst="bentConnector3">
             <a:avLst>
@@ -4692,24 +4698,24 @@
       </p:cxnSp>
       <p:cxnSp>
         <p:nvCxnSpPr>
-          <p:cNvPr id="616" name="Connector: Elbow 615">
-            <a:extLst>
-              <a:ext uri="{FF2B5EF4-FFF2-40B4-BE49-F238E27FC236}">
-                <a16:creationId xmlns:a16="http://schemas.microsoft.com/office/drawing/2014/main" id="{1035C77E-9F34-4270-B04A-A7B3697AEB4A}"/>
+          <p:cNvPr id="622" name="Connector: Elbow 621">
+            <a:extLst>
+              <a:ext uri="{FF2B5EF4-FFF2-40B4-BE49-F238E27FC236}">
+                <a16:creationId xmlns:a16="http://schemas.microsoft.com/office/drawing/2014/main" id="{715B98DD-3D25-4F31-8F3B-5D7942718652}"/>
               </a:ext>
             </a:extLst>
           </p:cNvPr>
           <p:cNvCxnSpPr>
             <a:cxnSpLocks/>
             <a:stCxn id="49" idx="2"/>
-            <a:endCxn id="16" idx="0"/>
+            <a:endCxn id="23" idx="0"/>
           </p:cNvCxnSpPr>
           <p:nvPr/>
         </p:nvCxnSpPr>
         <p:spPr>
-          <a:xfrm rot="5400000">
-            <a:off x="5153192" y="369109"/>
-            <a:ext cx="529446" cy="1349264"/>
+          <a:xfrm rot="16200000" flipH="1">
+            <a:off x="7858165" y="-986600"/>
+            <a:ext cx="521223" cy="4052458"/>
           </a:xfrm>
           <a:prstGeom prst="bentConnector3">
             <a:avLst>
@@ -4740,24 +4746,24 @@
       </p:cxnSp>
       <p:cxnSp>
         <p:nvCxnSpPr>
-          <p:cNvPr id="619" name="Connector: Elbow 618">
-            <a:extLst>
-              <a:ext uri="{FF2B5EF4-FFF2-40B4-BE49-F238E27FC236}">
-                <a16:creationId xmlns:a16="http://schemas.microsoft.com/office/drawing/2014/main" id="{88264546-4774-4B75-B3A7-81BF74CC5551}"/>
+          <p:cNvPr id="625" name="Connector: Elbow 624">
+            <a:extLst>
+              <a:ext uri="{FF2B5EF4-FFF2-40B4-BE49-F238E27FC236}">
+                <a16:creationId xmlns:a16="http://schemas.microsoft.com/office/drawing/2014/main" id="{62770DFC-5A08-43F0-AB2F-91A79E8D3A0E}"/>
               </a:ext>
             </a:extLst>
           </p:cNvPr>
           <p:cNvCxnSpPr>
             <a:cxnSpLocks/>
             <a:stCxn id="49" idx="2"/>
-            <a:endCxn id="17" idx="0"/>
+            <a:endCxn id="19" idx="0"/>
           </p:cNvCxnSpPr>
           <p:nvPr/>
         </p:nvCxnSpPr>
         <p:spPr>
           <a:xfrm rot="5400000">
-            <a:off x="4475065" y="-309018"/>
-            <a:ext cx="529447" cy="2705518"/>
+            <a:off x="4477434" y="-309961"/>
+            <a:ext cx="526134" cy="2704092"/>
           </a:xfrm>
           <a:prstGeom prst="bentConnector3">
             <a:avLst>
@@ -4788,24 +4794,24 @@
       </p:cxnSp>
       <p:cxnSp>
         <p:nvCxnSpPr>
-          <p:cNvPr id="622" name="Connector: Elbow 621">
-            <a:extLst>
-              <a:ext uri="{FF2B5EF4-FFF2-40B4-BE49-F238E27FC236}">
-                <a16:creationId xmlns:a16="http://schemas.microsoft.com/office/drawing/2014/main" id="{715B98DD-3D25-4F31-8F3B-5D7942718652}"/>
+          <p:cNvPr id="628" name="Connector: Elbow 627">
+            <a:extLst>
+              <a:ext uri="{FF2B5EF4-FFF2-40B4-BE49-F238E27FC236}">
+                <a16:creationId xmlns:a16="http://schemas.microsoft.com/office/drawing/2014/main" id="{9032F930-1C23-4D01-857D-AED36428BB10}"/>
               </a:ext>
             </a:extLst>
           </p:cNvPr>
           <p:cNvCxnSpPr>
             <a:cxnSpLocks/>
             <a:stCxn id="49" idx="2"/>
-            <a:endCxn id="23" idx="0"/>
+            <a:endCxn id="22" idx="0"/>
           </p:cNvCxnSpPr>
           <p:nvPr/>
         </p:nvCxnSpPr>
         <p:spPr>
           <a:xfrm rot="5400000">
-            <a:off x="3799091" y="-991946"/>
-            <a:ext cx="522493" cy="4064421"/>
+            <a:off x="5155771" y="363464"/>
+            <a:ext cx="521223" cy="1352330"/>
           </a:xfrm>
           <a:prstGeom prst="bentConnector3">
             <a:avLst>
@@ -4836,24 +4842,24 @@
       </p:cxnSp>
       <p:cxnSp>
         <p:nvCxnSpPr>
-          <p:cNvPr id="625" name="Connector: Elbow 624">
-            <a:extLst>
-              <a:ext uri="{FF2B5EF4-FFF2-40B4-BE49-F238E27FC236}">
-                <a16:creationId xmlns:a16="http://schemas.microsoft.com/office/drawing/2014/main" id="{62770DFC-5A08-43F0-AB2F-91A79E8D3A0E}"/>
+          <p:cNvPr id="631" name="Connector: Elbow 630">
+            <a:extLst>
+              <a:ext uri="{FF2B5EF4-FFF2-40B4-BE49-F238E27FC236}">
+                <a16:creationId xmlns:a16="http://schemas.microsoft.com/office/drawing/2014/main" id="{ADBA5472-27B1-4CF7-A53F-A81AE12C1FC0}"/>
               </a:ext>
             </a:extLst>
           </p:cNvPr>
           <p:cNvCxnSpPr>
             <a:cxnSpLocks/>
             <a:stCxn id="49" idx="2"/>
-            <a:endCxn id="19" idx="0"/>
+            <a:endCxn id="24" idx="0"/>
           </p:cNvCxnSpPr>
           <p:nvPr/>
         </p:nvCxnSpPr>
         <p:spPr>
-          <a:xfrm rot="16200000" flipH="1">
-            <a:off x="6513792" y="357773"/>
-            <a:ext cx="520734" cy="1363224"/>
+          <a:xfrm rot="5400000">
+            <a:off x="3801269" y="-986126"/>
+            <a:ext cx="526134" cy="4056422"/>
           </a:xfrm>
           <a:prstGeom prst="bentConnector3">
             <a:avLst>
@@ -4884,24 +4890,24 @@
       </p:cxnSp>
       <p:cxnSp>
         <p:nvCxnSpPr>
-          <p:cNvPr id="628" name="Connector: Elbow 627">
-            <a:extLst>
-              <a:ext uri="{FF2B5EF4-FFF2-40B4-BE49-F238E27FC236}">
-                <a16:creationId xmlns:a16="http://schemas.microsoft.com/office/drawing/2014/main" id="{9032F930-1C23-4D01-857D-AED36428BB10}"/>
+          <p:cNvPr id="634" name="Connector: Elbow 633">
+            <a:extLst>
+              <a:ext uri="{FF2B5EF4-FFF2-40B4-BE49-F238E27FC236}">
+                <a16:creationId xmlns:a16="http://schemas.microsoft.com/office/drawing/2014/main" id="{A12023F2-3777-489E-A0F7-9BA7BC85DE86}"/>
               </a:ext>
             </a:extLst>
           </p:cNvPr>
           <p:cNvCxnSpPr>
             <a:cxnSpLocks/>
             <a:stCxn id="49" idx="2"/>
-            <a:endCxn id="22" idx="0"/>
+            <a:endCxn id="21" idx="0"/>
           </p:cNvCxnSpPr>
           <p:nvPr/>
         </p:nvCxnSpPr>
         <p:spPr>
           <a:xfrm rot="16200000" flipH="1">
-            <a:off x="7186266" y="-314702"/>
-            <a:ext cx="529446" cy="2716885"/>
+            <a:off x="6511386" y="360179"/>
+            <a:ext cx="514084" cy="1351762"/>
           </a:xfrm>
           <a:prstGeom prst="bentConnector3">
             <a:avLst>
@@ -4932,24 +4938,24 @@
       </p:cxnSp>
       <p:cxnSp>
         <p:nvCxnSpPr>
-          <p:cNvPr id="631" name="Connector: Elbow 630">
-            <a:extLst>
-              <a:ext uri="{FF2B5EF4-FFF2-40B4-BE49-F238E27FC236}">
-                <a16:creationId xmlns:a16="http://schemas.microsoft.com/office/drawing/2014/main" id="{ADBA5472-27B1-4CF7-A53F-A81AE12C1FC0}"/>
+          <p:cNvPr id="637" name="Connector: Elbow 636">
+            <a:extLst>
+              <a:ext uri="{FF2B5EF4-FFF2-40B4-BE49-F238E27FC236}">
+                <a16:creationId xmlns:a16="http://schemas.microsoft.com/office/drawing/2014/main" id="{46E0E8C2-8A65-43D5-B574-F451D1C5BCA2}"/>
               </a:ext>
             </a:extLst>
           </p:cNvPr>
           <p:cNvCxnSpPr>
             <a:cxnSpLocks/>
             <a:stCxn id="49" idx="2"/>
-            <a:endCxn id="24" idx="0"/>
+            <a:endCxn id="20" idx="0"/>
           </p:cNvCxnSpPr>
           <p:nvPr/>
         </p:nvCxnSpPr>
         <p:spPr>
           <a:xfrm rot="16200000" flipH="1">
-            <a:off x="5834764" y="1036801"/>
-            <a:ext cx="521675" cy="6108"/>
+            <a:off x="5839486" y="1032079"/>
+            <a:ext cx="506947" cy="824"/>
           </a:xfrm>
           <a:prstGeom prst="bentConnector3">
             <a:avLst>
@@ -4978,148 +4984,6 @@
           </a:fontRef>
         </p:style>
       </p:cxnSp>
-      <p:cxnSp>
-        <p:nvCxnSpPr>
-          <p:cNvPr id="634" name="Connector: Elbow 633">
-            <a:extLst>
-              <a:ext uri="{FF2B5EF4-FFF2-40B4-BE49-F238E27FC236}">
-                <a16:creationId xmlns:a16="http://schemas.microsoft.com/office/drawing/2014/main" id="{A12023F2-3777-489E-A0F7-9BA7BC85DE86}"/>
-              </a:ext>
-            </a:extLst>
-          </p:cNvPr>
-          <p:cNvCxnSpPr>
-            <a:cxnSpLocks/>
-            <a:stCxn id="49" idx="2"/>
-            <a:endCxn id="21" idx="0"/>
-          </p:cNvCxnSpPr>
-          <p:nvPr/>
-        </p:nvCxnSpPr>
-        <p:spPr>
-          <a:xfrm rot="16200000" flipH="1">
-            <a:off x="8540544" y="-1668980"/>
-            <a:ext cx="531654" cy="5427649"/>
-          </a:xfrm>
-          <a:prstGeom prst="bentConnector3">
-            <a:avLst>
-              <a:gd name="adj1" fmla="val 50000"/>
-            </a:avLst>
-          </a:prstGeom>
-          <a:ln>
-            <a:solidFill>
-              <a:schemeClr val="tx1"/>
-            </a:solidFill>
-            <a:tailEnd type="triangle"/>
-          </a:ln>
-        </p:spPr>
-        <p:style>
-          <a:lnRef idx="1">
-            <a:schemeClr val="accent1"/>
-          </a:lnRef>
-          <a:fillRef idx="0">
-            <a:schemeClr val="accent1"/>
-          </a:fillRef>
-          <a:effectRef idx="0">
-            <a:schemeClr val="accent1"/>
-          </a:effectRef>
-          <a:fontRef idx="minor">
-            <a:schemeClr val="tx1"/>
-          </a:fontRef>
-        </p:style>
-      </p:cxnSp>
-      <p:cxnSp>
-        <p:nvCxnSpPr>
-          <p:cNvPr id="637" name="Connector: Elbow 636">
-            <a:extLst>
-              <a:ext uri="{FF2B5EF4-FFF2-40B4-BE49-F238E27FC236}">
-                <a16:creationId xmlns:a16="http://schemas.microsoft.com/office/drawing/2014/main" id="{46E0E8C2-8A65-43D5-B574-F451D1C5BCA2}"/>
-              </a:ext>
-            </a:extLst>
-          </p:cNvPr>
-          <p:cNvCxnSpPr>
-            <a:cxnSpLocks/>
-            <a:stCxn id="49" idx="2"/>
-            <a:endCxn id="20" idx="0"/>
-          </p:cNvCxnSpPr>
-          <p:nvPr/>
-        </p:nvCxnSpPr>
-        <p:spPr>
-          <a:xfrm rot="16200000" flipH="1">
-            <a:off x="7864991" y="-993426"/>
-            <a:ext cx="525658" cy="4070546"/>
-          </a:xfrm>
-          <a:prstGeom prst="bentConnector3">
-            <a:avLst>
-              <a:gd name="adj1" fmla="val 50000"/>
-            </a:avLst>
-          </a:prstGeom>
-          <a:ln>
-            <a:solidFill>
-              <a:schemeClr val="tx1"/>
-            </a:solidFill>
-            <a:tailEnd type="triangle"/>
-          </a:ln>
-        </p:spPr>
-        <p:style>
-          <a:lnRef idx="1">
-            <a:schemeClr val="accent1"/>
-          </a:lnRef>
-          <a:fillRef idx="0">
-            <a:schemeClr val="accent1"/>
-          </a:fillRef>
-          <a:effectRef idx="0">
-            <a:schemeClr val="accent1"/>
-          </a:effectRef>
-          <a:fontRef idx="minor">
-            <a:schemeClr val="tx1"/>
-          </a:fontRef>
-        </p:style>
-      </p:cxnSp>
-      <p:cxnSp>
-        <p:nvCxnSpPr>
-          <p:cNvPr id="1314" name="Connector: Elbow 1313">
-            <a:extLst>
-              <a:ext uri="{FF2B5EF4-FFF2-40B4-BE49-F238E27FC236}">
-                <a16:creationId xmlns:a16="http://schemas.microsoft.com/office/drawing/2014/main" id="{5893B2AC-78F5-4482-A493-066A4200CBE4}"/>
-              </a:ext>
-            </a:extLst>
-          </p:cNvPr>
-          <p:cNvCxnSpPr>
-            <a:cxnSpLocks/>
-            <a:stCxn id="21" idx="2"/>
-            <a:endCxn id="559" idx="3"/>
-          </p:cNvCxnSpPr>
-          <p:nvPr/>
-        </p:nvCxnSpPr>
-        <p:spPr>
-          <a:xfrm rot="5400000">
-            <a:off x="5826195" y="639522"/>
-            <a:ext cx="3724522" cy="7663481"/>
-          </a:xfrm>
-          <a:prstGeom prst="bentConnector2">
-            <a:avLst/>
-          </a:prstGeom>
-          <a:ln>
-            <a:solidFill>
-              <a:schemeClr val="tx1"/>
-            </a:solidFill>
-            <a:tailEnd type="triangle"/>
-          </a:ln>
-        </p:spPr>
-        <p:style>
-          <a:lnRef idx="1">
-            <a:schemeClr val="accent1"/>
-          </a:lnRef>
-          <a:fillRef idx="0">
-            <a:schemeClr val="accent1"/>
-          </a:fillRef>
-          <a:effectRef idx="0">
-            <a:schemeClr val="accent1"/>
-          </a:effectRef>
-          <a:fontRef idx="minor">
-            <a:schemeClr val="tx1"/>
-          </a:fontRef>
-        </p:style>
-      </p:cxnSp>
       <p:sp>
         <p:nvSpPr>
           <p:cNvPr id="85" name="Rectangle: Rounded Corners 84">
@@ -5134,8 +4998,8 @@
         </p:nvSpPr>
         <p:spPr>
           <a:xfrm>
-            <a:off x="75299" y="1308464"/>
-            <a:ext cx="1200936" cy="1298329"/>
+            <a:off x="10846694" y="1309505"/>
+            <a:ext cx="1287066" cy="1098306"/>
           </a:xfrm>
           <a:prstGeom prst="roundRect">
             <a:avLst/>
@@ -5180,24 +5044,24 @@
       </p:sp>
       <p:cxnSp>
         <p:nvCxnSpPr>
-          <p:cNvPr id="86" name="Connector: Elbow 85">
-            <a:extLst>
-              <a:ext uri="{FF2B5EF4-FFF2-40B4-BE49-F238E27FC236}">
-                <a16:creationId xmlns:a16="http://schemas.microsoft.com/office/drawing/2014/main" id="{2E454C19-0BB6-48AD-BAE8-CC162C44D2A1}"/>
+          <p:cNvPr id="87" name="Connector: Elbow 86">
+            <a:extLst>
+              <a:ext uri="{FF2B5EF4-FFF2-40B4-BE49-F238E27FC236}">
+                <a16:creationId xmlns:a16="http://schemas.microsoft.com/office/drawing/2014/main" id="{BD9C697D-CE25-425C-8A5E-86CFD784B91C}"/>
               </a:ext>
             </a:extLst>
           </p:cNvPr>
           <p:cNvCxnSpPr>
             <a:cxnSpLocks/>
-            <a:stCxn id="85" idx="2"/>
-            <a:endCxn id="559" idx="0"/>
+            <a:stCxn id="49" idx="2"/>
+            <a:endCxn id="85" idx="0"/>
           </p:cNvCxnSpPr>
           <p:nvPr/>
         </p:nvCxnSpPr>
         <p:spPr>
           <a:xfrm rot="16200000" flipH="1">
-            <a:off x="-36195" y="3318755"/>
-            <a:ext cx="3389336" cy="1965412"/>
+            <a:off x="8526144" y="-1654579"/>
+            <a:ext cx="530487" cy="5397680"/>
           </a:xfrm>
           <a:prstGeom prst="bentConnector3">
             <a:avLst>
@@ -5226,24 +5090,586 @@
           </a:fontRef>
         </p:style>
       </p:cxnSp>
+      <p:sp>
+        <p:nvSpPr>
+          <p:cNvPr id="31" name="Rectangle: Rounded Corners 30">
+            <a:extLst>
+              <a:ext uri="{FF2B5EF4-FFF2-40B4-BE49-F238E27FC236}">
+                <a16:creationId xmlns:a16="http://schemas.microsoft.com/office/drawing/2014/main" id="{46BB1D9B-5E47-4E6F-A292-93E8B923D4C9}"/>
+              </a:ext>
+            </a:extLst>
+          </p:cNvPr>
+          <p:cNvSpPr/>
+          <p:nvPr/>
+        </p:nvSpPr>
+        <p:spPr>
+          <a:xfrm>
+            <a:off x="6911367" y="4026058"/>
+            <a:ext cx="1371600" cy="457200"/>
+          </a:xfrm>
+          <a:prstGeom prst="roundRect">
+            <a:avLst/>
+          </a:prstGeom>
+          <a:ln>
+            <a:solidFill>
+              <a:schemeClr val="tx1"/>
+            </a:solidFill>
+          </a:ln>
+        </p:spPr>
+        <p:style>
+          <a:lnRef idx="2">
+            <a:schemeClr val="accent6"/>
+          </a:lnRef>
+          <a:fillRef idx="1">
+            <a:schemeClr val="lt1"/>
+          </a:fillRef>
+          <a:effectRef idx="0">
+            <a:schemeClr val="accent6"/>
+          </a:effectRef>
+          <a:fontRef idx="minor">
+            <a:schemeClr val="dk1"/>
+          </a:fontRef>
+        </p:style>
+        <p:txBody>
+          <a:bodyPr rtlCol="0" anchor="ctr"/>
+          <a:lstStyle/>
+          <a:p>
+            <a:pPr algn="ctr"/>
+            <a:r>
+              <a:rPr lang="en-US" sz="1200" dirty="0"/>
+              <a:t>BLS QCEW </a:t>
+            </a:r>
+          </a:p>
+          <a:p>
+            <a:pPr algn="ctr"/>
+            <a:r>
+              <a:rPr lang="en-US" sz="1200" dirty="0"/>
+              <a:t>Employment data</a:t>
+            </a:r>
+          </a:p>
+        </p:txBody>
+      </p:sp>
+      <p:sp>
+        <p:nvSpPr>
+          <p:cNvPr id="168" name="Rectangle: Rounded Corners 167">
+            <a:extLst>
+              <a:ext uri="{FF2B5EF4-FFF2-40B4-BE49-F238E27FC236}">
+                <a16:creationId xmlns:a16="http://schemas.microsoft.com/office/drawing/2014/main" id="{D323D1CE-A040-4937-A8AE-CA84B3F78784}"/>
+              </a:ext>
+            </a:extLst>
+          </p:cNvPr>
+          <p:cNvSpPr/>
+          <p:nvPr/>
+        </p:nvSpPr>
+        <p:spPr>
+          <a:xfrm>
+            <a:off x="10317541" y="3055320"/>
+            <a:ext cx="1004247" cy="878325"/>
+          </a:xfrm>
+          <a:prstGeom prst="roundRect">
+            <a:avLst/>
+          </a:prstGeom>
+          <a:ln>
+            <a:solidFill>
+              <a:schemeClr val="tx1"/>
+            </a:solidFill>
+          </a:ln>
+        </p:spPr>
+        <p:style>
+          <a:lnRef idx="2">
+            <a:schemeClr val="accent6"/>
+          </a:lnRef>
+          <a:fillRef idx="1">
+            <a:schemeClr val="lt1"/>
+          </a:fillRef>
+          <a:effectRef idx="0">
+            <a:schemeClr val="accent6"/>
+          </a:effectRef>
+          <a:fontRef idx="minor">
+            <a:schemeClr val="dk1"/>
+          </a:fontRef>
+        </p:style>
+        <p:txBody>
+          <a:bodyPr rtlCol="0" anchor="ctr"/>
+          <a:lstStyle/>
+          <a:p>
+            <a:pPr algn="ctr"/>
+            <a:r>
+              <a:rPr lang="en-US" sz="1200" dirty="0"/>
+              <a:t>USDA Census of Agriculture</a:t>
+            </a:r>
+          </a:p>
+          <a:p>
+            <a:pPr algn="ctr"/>
+            <a:r>
+              <a:rPr lang="en-US" sz="1200" dirty="0"/>
+              <a:t>Acreage</a:t>
+            </a:r>
+          </a:p>
+        </p:txBody>
+      </p:sp>
+      <p:sp>
+        <p:nvSpPr>
+          <p:cNvPr id="169" name="Rectangle: Rounded Corners 168">
+            <a:extLst>
+              <a:ext uri="{FF2B5EF4-FFF2-40B4-BE49-F238E27FC236}">
+                <a16:creationId xmlns:a16="http://schemas.microsoft.com/office/drawing/2014/main" id="{DF987C60-2EB1-476A-881A-7949E95C2A7F}"/>
+              </a:ext>
+            </a:extLst>
+          </p:cNvPr>
+          <p:cNvSpPr/>
+          <p:nvPr/>
+        </p:nvSpPr>
+        <p:spPr>
+          <a:xfrm>
+            <a:off x="5060740" y="4783525"/>
+            <a:ext cx="1311216" cy="461119"/>
+          </a:xfrm>
+          <a:prstGeom prst="roundRect">
+            <a:avLst/>
+          </a:prstGeom>
+          <a:ln>
+            <a:solidFill>
+              <a:schemeClr val="tx1"/>
+            </a:solidFill>
+          </a:ln>
+        </p:spPr>
+        <p:style>
+          <a:lnRef idx="2">
+            <a:schemeClr val="accent6"/>
+          </a:lnRef>
+          <a:fillRef idx="1">
+            <a:schemeClr val="lt1"/>
+          </a:fillRef>
+          <a:effectRef idx="0">
+            <a:schemeClr val="accent6"/>
+          </a:effectRef>
+          <a:fontRef idx="minor">
+            <a:schemeClr val="dk1"/>
+          </a:fontRef>
+        </p:style>
+        <p:txBody>
+          <a:bodyPr rtlCol="0" anchor="ctr"/>
+          <a:lstStyle/>
+          <a:p>
+            <a:pPr algn="ctr"/>
+            <a:r>
+              <a:rPr lang="en-US" sz="1200" dirty="0"/>
+              <a:t>EIA CBECS Land</a:t>
+            </a:r>
+          </a:p>
+        </p:txBody>
+      </p:sp>
+      <p:sp>
+        <p:nvSpPr>
+          <p:cNvPr id="170" name="Rectangle: Rounded Corners 169">
+            <a:extLst>
+              <a:ext uri="{FF2B5EF4-FFF2-40B4-BE49-F238E27FC236}">
+                <a16:creationId xmlns:a16="http://schemas.microsoft.com/office/drawing/2014/main" id="{F28F41F9-0494-446A-8E89-C483F9990694}"/>
+              </a:ext>
+            </a:extLst>
+          </p:cNvPr>
+          <p:cNvSpPr/>
+          <p:nvPr/>
+        </p:nvSpPr>
+        <p:spPr>
+          <a:xfrm>
+            <a:off x="5060739" y="4158511"/>
+            <a:ext cx="1311216" cy="461119"/>
+          </a:xfrm>
+          <a:prstGeom prst="roundRect">
+            <a:avLst/>
+          </a:prstGeom>
+          <a:ln>
+            <a:solidFill>
+              <a:schemeClr val="tx1"/>
+            </a:solidFill>
+          </a:ln>
+        </p:spPr>
+        <p:style>
+          <a:lnRef idx="2">
+            <a:schemeClr val="accent6"/>
+          </a:lnRef>
+          <a:fillRef idx="1">
+            <a:schemeClr val="lt1"/>
+          </a:fillRef>
+          <a:effectRef idx="0">
+            <a:schemeClr val="accent6"/>
+          </a:effectRef>
+          <a:fontRef idx="minor">
+            <a:schemeClr val="dk1"/>
+          </a:fontRef>
+        </p:style>
+        <p:txBody>
+          <a:bodyPr rtlCol="0" anchor="ctr"/>
+          <a:lstStyle/>
+          <a:p>
+            <a:pPr algn="ctr"/>
+            <a:r>
+              <a:rPr lang="en-US" sz="1200" dirty="0"/>
+              <a:t>EIA MECS Land</a:t>
+            </a:r>
+          </a:p>
+        </p:txBody>
+      </p:sp>
+      <p:sp>
+        <p:nvSpPr>
+          <p:cNvPr id="176" name="Rectangle: Rounded Corners 175">
+            <a:extLst>
+              <a:ext uri="{FF2B5EF4-FFF2-40B4-BE49-F238E27FC236}">
+                <a16:creationId xmlns:a16="http://schemas.microsoft.com/office/drawing/2014/main" id="{36291C17-014F-4B00-907A-F75C4EBA1C7B}"/>
+              </a:ext>
+            </a:extLst>
+          </p:cNvPr>
+          <p:cNvSpPr/>
+          <p:nvPr/>
+        </p:nvSpPr>
+        <p:spPr>
+          <a:xfrm>
+            <a:off x="6903259" y="4859312"/>
+            <a:ext cx="1371600" cy="457200"/>
+          </a:xfrm>
+          <a:prstGeom prst="roundRect">
+            <a:avLst/>
+          </a:prstGeom>
+          <a:ln>
+            <a:solidFill>
+              <a:schemeClr val="tx1"/>
+            </a:solidFill>
+          </a:ln>
+        </p:spPr>
+        <p:style>
+          <a:lnRef idx="2">
+            <a:schemeClr val="accent6"/>
+          </a:lnRef>
+          <a:fillRef idx="1">
+            <a:schemeClr val="lt1"/>
+          </a:fillRef>
+          <a:effectRef idx="0">
+            <a:schemeClr val="accent6"/>
+          </a:effectRef>
+          <a:fontRef idx="minor">
+            <a:schemeClr val="dk1"/>
+          </a:fontRef>
+        </p:style>
+        <p:txBody>
+          <a:bodyPr rtlCol="0" anchor="ctr"/>
+          <a:lstStyle/>
+          <a:p>
+            <a:pPr algn="ctr"/>
+            <a:r>
+              <a:rPr lang="en-US" sz="1200" dirty="0"/>
+              <a:t>BLM Public Land Statistics</a:t>
+            </a:r>
+          </a:p>
+        </p:txBody>
+      </p:sp>
+      <p:sp>
+        <p:nvSpPr>
+          <p:cNvPr id="177" name="Rectangle: Rounded Corners 176">
+            <a:extLst>
+              <a:ext uri="{FF2B5EF4-FFF2-40B4-BE49-F238E27FC236}">
+                <a16:creationId xmlns:a16="http://schemas.microsoft.com/office/drawing/2014/main" id="{E7BACB73-1861-4422-A452-A95818E1AAC4}"/>
+              </a:ext>
+            </a:extLst>
+          </p:cNvPr>
+          <p:cNvSpPr/>
+          <p:nvPr/>
+        </p:nvSpPr>
+        <p:spPr>
+          <a:xfrm>
+            <a:off x="8966922" y="2718552"/>
+            <a:ext cx="1048701" cy="878325"/>
+          </a:xfrm>
+          <a:prstGeom prst="roundRect">
+            <a:avLst/>
+          </a:prstGeom>
+          <a:ln>
+            <a:solidFill>
+              <a:schemeClr val="tx1"/>
+            </a:solidFill>
+          </a:ln>
+        </p:spPr>
+        <p:style>
+          <a:lnRef idx="2">
+            <a:schemeClr val="accent6"/>
+          </a:lnRef>
+          <a:fillRef idx="1">
+            <a:schemeClr val="lt1"/>
+          </a:fillRef>
+          <a:effectRef idx="0">
+            <a:schemeClr val="accent6"/>
+          </a:effectRef>
+          <a:fontRef idx="minor">
+            <a:schemeClr val="dk1"/>
+          </a:fontRef>
+        </p:style>
+        <p:txBody>
+          <a:bodyPr rtlCol="0" anchor="ctr"/>
+          <a:lstStyle/>
+          <a:p>
+            <a:pPr algn="ctr"/>
+            <a:r>
+              <a:rPr lang="en-US" sz="1200" dirty="0"/>
+              <a:t>USDA Census of Agriculture</a:t>
+            </a:r>
+          </a:p>
+          <a:p>
+            <a:pPr algn="ctr"/>
+            <a:r>
+              <a:rPr lang="en-US" sz="1200" dirty="0"/>
+              <a:t>Number of Farms</a:t>
+            </a:r>
+          </a:p>
+        </p:txBody>
+      </p:sp>
+      <p:sp>
+        <p:nvSpPr>
+          <p:cNvPr id="227" name="Rectangle: Rounded Corners 226">
+            <a:extLst>
+              <a:ext uri="{FF2B5EF4-FFF2-40B4-BE49-F238E27FC236}">
+                <a16:creationId xmlns:a16="http://schemas.microsoft.com/office/drawing/2014/main" id="{45EABCE7-4ADA-4F73-8D5F-6FDD38A4206F}"/>
+              </a:ext>
+            </a:extLst>
+          </p:cNvPr>
+          <p:cNvSpPr/>
+          <p:nvPr/>
+        </p:nvSpPr>
+        <p:spPr>
+          <a:xfrm>
+            <a:off x="9782549" y="6094968"/>
+            <a:ext cx="1357118" cy="477107"/>
+          </a:xfrm>
+          <a:prstGeom prst="roundRect">
+            <a:avLst/>
+          </a:prstGeom>
+          <a:solidFill>
+            <a:schemeClr val="accent6">
+              <a:lumMod val="40000"/>
+              <a:lumOff val="60000"/>
+            </a:schemeClr>
+          </a:solidFill>
+          <a:ln w="19050">
+            <a:solidFill>
+              <a:schemeClr val="tx1"/>
+            </a:solidFill>
+          </a:ln>
+        </p:spPr>
+        <p:style>
+          <a:lnRef idx="2">
+            <a:schemeClr val="accent6"/>
+          </a:lnRef>
+          <a:fillRef idx="1">
+            <a:schemeClr val="lt1"/>
+          </a:fillRef>
+          <a:effectRef idx="0">
+            <a:schemeClr val="accent6"/>
+          </a:effectRef>
+          <a:fontRef idx="minor">
+            <a:schemeClr val="dk1"/>
+          </a:fontRef>
+        </p:style>
+        <p:txBody>
+          <a:bodyPr rtlCol="0" anchor="ctr"/>
+          <a:lstStyle/>
+          <a:p>
+            <a:pPr algn="ctr"/>
+            <a:r>
+              <a:rPr lang="en-US" sz="1200" dirty="0"/>
+              <a:t>Cropland</a:t>
+            </a:r>
+          </a:p>
+          <a:p>
+            <a:pPr algn="ctr"/>
+            <a:r>
+              <a:rPr lang="en-US" sz="1200" dirty="0"/>
+              <a:t>NAICS6, FIPS</a:t>
+            </a:r>
+          </a:p>
+        </p:txBody>
+      </p:sp>
       <p:cxnSp>
         <p:nvCxnSpPr>
-          <p:cNvPr id="87" name="Connector: Elbow 86">
-            <a:extLst>
-              <a:ext uri="{FF2B5EF4-FFF2-40B4-BE49-F238E27FC236}">
-                <a16:creationId xmlns:a16="http://schemas.microsoft.com/office/drawing/2014/main" id="{BD9C697D-CE25-425C-8A5E-86CFD784B91C}"/>
+          <p:cNvPr id="236" name="Connector: Elbow 235">
+            <a:extLst>
+              <a:ext uri="{FF2B5EF4-FFF2-40B4-BE49-F238E27FC236}">
+                <a16:creationId xmlns:a16="http://schemas.microsoft.com/office/drawing/2014/main" id="{7CC38935-064D-48C5-AD2D-EAD7DC4D0621}"/>
               </a:ext>
             </a:extLst>
           </p:cNvPr>
           <p:cNvCxnSpPr>
             <a:cxnSpLocks/>
+            <a:stCxn id="168" idx="1"/>
+            <a:endCxn id="227" idx="0"/>
           </p:cNvCxnSpPr>
           <p:nvPr/>
         </p:nvCxnSpPr>
         <p:spPr>
-          <a:xfrm rot="5400000">
-            <a:off x="3116110" y="-1674643"/>
-            <a:ext cx="524621" cy="5435160"/>
+          <a:xfrm rot="10800000" flipH="1" flipV="1">
+            <a:off x="10317540" y="3494482"/>
+            <a:ext cx="143567" cy="2600485"/>
+          </a:xfrm>
+          <a:prstGeom prst="bentConnector4">
+            <a:avLst>
+              <a:gd name="adj1" fmla="val -123177"/>
+              <a:gd name="adj2" fmla="val 32901"/>
+            </a:avLst>
+          </a:prstGeom>
+          <a:ln>
+            <a:solidFill>
+              <a:schemeClr val="tx1"/>
+            </a:solidFill>
+            <a:tailEnd type="triangle"/>
+          </a:ln>
+        </p:spPr>
+        <p:style>
+          <a:lnRef idx="1">
+            <a:schemeClr val="accent1"/>
+          </a:lnRef>
+          <a:fillRef idx="0">
+            <a:schemeClr val="accent1"/>
+          </a:fillRef>
+          <a:effectRef idx="0">
+            <a:schemeClr val="accent1"/>
+          </a:effectRef>
+          <a:fontRef idx="minor">
+            <a:schemeClr val="tx1"/>
+          </a:fontRef>
+        </p:style>
+      </p:cxnSp>
+      <p:cxnSp>
+        <p:nvCxnSpPr>
+          <p:cNvPr id="239" name="Connector: Elbow 238">
+            <a:extLst>
+              <a:ext uri="{FF2B5EF4-FFF2-40B4-BE49-F238E27FC236}">
+                <a16:creationId xmlns:a16="http://schemas.microsoft.com/office/drawing/2014/main" id="{99E6B76E-DAF2-4FB8-B97E-399D2FED56C6}"/>
+              </a:ext>
+            </a:extLst>
+          </p:cNvPr>
+          <p:cNvCxnSpPr>
+            <a:cxnSpLocks/>
+            <a:stCxn id="168" idx="3"/>
+            <a:endCxn id="227" idx="3"/>
+          </p:cNvCxnSpPr>
+          <p:nvPr/>
+        </p:nvCxnSpPr>
+        <p:spPr>
+          <a:xfrm flipH="1">
+            <a:off x="11139667" y="3494483"/>
+            <a:ext cx="182121" cy="2839039"/>
+          </a:xfrm>
+          <a:prstGeom prst="bentConnector3">
+            <a:avLst>
+              <a:gd name="adj1" fmla="val -92364"/>
+            </a:avLst>
+          </a:prstGeom>
+          <a:ln>
+            <a:solidFill>
+              <a:schemeClr val="tx1"/>
+            </a:solidFill>
+            <a:tailEnd type="triangle"/>
+          </a:ln>
+        </p:spPr>
+        <p:style>
+          <a:lnRef idx="1">
+            <a:schemeClr val="accent1"/>
+          </a:lnRef>
+          <a:fillRef idx="0">
+            <a:schemeClr val="accent1"/>
+          </a:fillRef>
+          <a:effectRef idx="0">
+            <a:schemeClr val="accent1"/>
+          </a:effectRef>
+          <a:fontRef idx="minor">
+            <a:schemeClr val="tx1"/>
+          </a:fontRef>
+        </p:style>
+      </p:cxnSp>
+      <p:sp>
+        <p:nvSpPr>
+          <p:cNvPr id="252" name="Rectangle: Rounded Corners 251">
+            <a:extLst>
+              <a:ext uri="{FF2B5EF4-FFF2-40B4-BE49-F238E27FC236}">
+                <a16:creationId xmlns:a16="http://schemas.microsoft.com/office/drawing/2014/main" id="{1D0DF4B1-6AF2-4B57-A132-C4DD40FF6A56}"/>
+              </a:ext>
+            </a:extLst>
+          </p:cNvPr>
+          <p:cNvSpPr/>
+          <p:nvPr/>
+        </p:nvSpPr>
+        <p:spPr>
+          <a:xfrm>
+            <a:off x="8957504" y="4558262"/>
+            <a:ext cx="1357118" cy="477107"/>
+          </a:xfrm>
+          <a:prstGeom prst="roundRect">
+            <a:avLst/>
+          </a:prstGeom>
+          <a:solidFill>
+            <a:schemeClr val="accent6">
+              <a:lumMod val="40000"/>
+              <a:lumOff val="60000"/>
+            </a:schemeClr>
+          </a:solidFill>
+          <a:ln w="19050">
+            <a:solidFill>
+              <a:schemeClr val="tx1"/>
+            </a:solidFill>
+          </a:ln>
+        </p:spPr>
+        <p:style>
+          <a:lnRef idx="2">
+            <a:schemeClr val="accent6"/>
+          </a:lnRef>
+          <a:fillRef idx="1">
+            <a:schemeClr val="lt1"/>
+          </a:fillRef>
+          <a:effectRef idx="0">
+            <a:schemeClr val="accent6"/>
+          </a:effectRef>
+          <a:fontRef idx="minor">
+            <a:schemeClr val="dk1"/>
+          </a:fontRef>
+        </p:style>
+        <p:txBody>
+          <a:bodyPr rtlCol="0" anchor="ctr"/>
+          <a:lstStyle/>
+          <a:p>
+            <a:pPr algn="ctr"/>
+            <a:r>
+              <a:rPr lang="en-US" sz="1200" dirty="0"/>
+              <a:t>Pastureland</a:t>
+            </a:r>
+          </a:p>
+          <a:p>
+            <a:pPr algn="ctr"/>
+            <a:r>
+              <a:rPr lang="en-US" sz="1200" dirty="0"/>
+              <a:t>NAICS6, FIPS</a:t>
+            </a:r>
+          </a:p>
+        </p:txBody>
+      </p:sp>
+      <p:cxnSp>
+        <p:nvCxnSpPr>
+          <p:cNvPr id="269" name="Connector: Elbow 268">
+            <a:extLst>
+              <a:ext uri="{FF2B5EF4-FFF2-40B4-BE49-F238E27FC236}">
+                <a16:creationId xmlns:a16="http://schemas.microsoft.com/office/drawing/2014/main" id="{8A6BB4C6-D16E-417C-8D8F-9A08EFDB8D07}"/>
+              </a:ext>
+            </a:extLst>
+          </p:cNvPr>
+          <p:cNvCxnSpPr>
+            <a:cxnSpLocks/>
+            <a:stCxn id="177" idx="2"/>
+            <a:endCxn id="252" idx="0"/>
+          </p:cNvCxnSpPr>
+          <p:nvPr/>
+        </p:nvCxnSpPr>
+        <p:spPr>
+          <a:xfrm rot="16200000" flipH="1">
+            <a:off x="9082976" y="4005174"/>
+            <a:ext cx="961385" cy="144790"/>
           </a:xfrm>
           <a:prstGeom prst="bentConnector3">
             <a:avLst>
@@ -5251,6 +5677,1433 @@
             </a:avLst>
           </a:prstGeom>
           <a:ln>
+            <a:solidFill>
+              <a:schemeClr val="tx1"/>
+            </a:solidFill>
+            <a:tailEnd type="triangle"/>
+          </a:ln>
+        </p:spPr>
+        <p:style>
+          <a:lnRef idx="1">
+            <a:schemeClr val="accent1"/>
+          </a:lnRef>
+          <a:fillRef idx="0">
+            <a:schemeClr val="accent1"/>
+          </a:fillRef>
+          <a:effectRef idx="0">
+            <a:schemeClr val="accent1"/>
+          </a:effectRef>
+          <a:fontRef idx="minor">
+            <a:schemeClr val="tx1"/>
+          </a:fontRef>
+        </p:style>
+      </p:cxnSp>
+      <p:cxnSp>
+        <p:nvCxnSpPr>
+          <p:cNvPr id="318" name="Connector: Elbow 317">
+            <a:extLst>
+              <a:ext uri="{FF2B5EF4-FFF2-40B4-BE49-F238E27FC236}">
+                <a16:creationId xmlns:a16="http://schemas.microsoft.com/office/drawing/2014/main" id="{5BD62B20-75D3-475B-BD78-7F0A8B756F34}"/>
+              </a:ext>
+            </a:extLst>
+          </p:cNvPr>
+          <p:cNvCxnSpPr>
+            <a:cxnSpLocks/>
+            <a:stCxn id="252" idx="2"/>
+            <a:endCxn id="559" idx="3"/>
+          </p:cNvCxnSpPr>
+          <p:nvPr/>
+        </p:nvCxnSpPr>
+        <p:spPr>
+          <a:xfrm rot="5400000">
+            <a:off x="6097312" y="2794772"/>
+            <a:ext cx="1298154" cy="5779348"/>
+          </a:xfrm>
+          <a:prstGeom prst="bentConnector2">
+            <a:avLst/>
+          </a:prstGeom>
+          <a:ln>
+            <a:solidFill>
+              <a:schemeClr val="tx1"/>
+            </a:solidFill>
+            <a:tailEnd type="triangle"/>
+          </a:ln>
+        </p:spPr>
+        <p:style>
+          <a:lnRef idx="1">
+            <a:schemeClr val="accent1"/>
+          </a:lnRef>
+          <a:fillRef idx="0">
+            <a:schemeClr val="accent1"/>
+          </a:fillRef>
+          <a:effectRef idx="0">
+            <a:schemeClr val="accent1"/>
+          </a:effectRef>
+          <a:fontRef idx="minor">
+            <a:schemeClr val="tx1"/>
+          </a:fontRef>
+        </p:style>
+      </p:cxnSp>
+      <p:sp>
+        <p:nvSpPr>
+          <p:cNvPr id="376" name="Rectangle: Rounded Corners 375">
+            <a:extLst>
+              <a:ext uri="{FF2B5EF4-FFF2-40B4-BE49-F238E27FC236}">
+                <a16:creationId xmlns:a16="http://schemas.microsoft.com/office/drawing/2014/main" id="{24C77ED7-1D3D-4481-8393-10E84D2944B5}"/>
+              </a:ext>
+            </a:extLst>
+          </p:cNvPr>
+          <p:cNvSpPr/>
+          <p:nvPr/>
+        </p:nvSpPr>
+        <p:spPr>
+          <a:xfrm>
+            <a:off x="2655148" y="3846217"/>
+            <a:ext cx="1311216" cy="911878"/>
+          </a:xfrm>
+          <a:prstGeom prst="roundRect">
+            <a:avLst/>
+          </a:prstGeom>
+          <a:ln>
+            <a:solidFill>
+              <a:schemeClr val="tx1"/>
+            </a:solidFill>
+          </a:ln>
+        </p:spPr>
+        <p:style>
+          <a:lnRef idx="2">
+            <a:schemeClr val="accent6"/>
+          </a:lnRef>
+          <a:fillRef idx="1">
+            <a:schemeClr val="lt1"/>
+          </a:fillRef>
+          <a:effectRef idx="0">
+            <a:schemeClr val="accent6"/>
+          </a:effectRef>
+          <a:fontRef idx="minor">
+            <a:schemeClr val="dk1"/>
+          </a:fontRef>
+        </p:style>
+        <p:txBody>
+          <a:bodyPr rtlCol="0" anchor="ctr"/>
+          <a:lstStyle/>
+          <a:p>
+            <a:pPr algn="ctr"/>
+            <a:r>
+              <a:rPr lang="en-US" sz="1200" dirty="0"/>
+              <a:t>Land Use assumptions for airports, railroads</a:t>
+            </a:r>
+          </a:p>
+        </p:txBody>
+      </p:sp>
+      <p:sp>
+        <p:nvSpPr>
+          <p:cNvPr id="377" name="Rectangle: Rounded Corners 376">
+            <a:extLst>
+              <a:ext uri="{FF2B5EF4-FFF2-40B4-BE49-F238E27FC236}">
+                <a16:creationId xmlns:a16="http://schemas.microsoft.com/office/drawing/2014/main" id="{99208776-8E13-4248-98A2-D56B6832952D}"/>
+              </a:ext>
+            </a:extLst>
+          </p:cNvPr>
+          <p:cNvSpPr/>
+          <p:nvPr/>
+        </p:nvSpPr>
+        <p:spPr>
+          <a:xfrm>
+            <a:off x="2650996" y="3066566"/>
+            <a:ext cx="1311216" cy="520187"/>
+          </a:xfrm>
+          <a:prstGeom prst="roundRect">
+            <a:avLst/>
+          </a:prstGeom>
+          <a:ln>
+            <a:solidFill>
+              <a:schemeClr val="tx1"/>
+            </a:solidFill>
+          </a:ln>
+        </p:spPr>
+        <p:style>
+          <a:lnRef idx="2">
+            <a:schemeClr val="accent6"/>
+          </a:lnRef>
+          <a:fillRef idx="1">
+            <a:schemeClr val="lt1"/>
+          </a:fillRef>
+          <a:effectRef idx="0">
+            <a:schemeClr val="accent6"/>
+          </a:effectRef>
+          <a:fontRef idx="minor">
+            <a:schemeClr val="dk1"/>
+          </a:fontRef>
+        </p:style>
+        <p:txBody>
+          <a:bodyPr rtlCol="0" anchor="ctr"/>
+          <a:lstStyle/>
+          <a:p>
+            <a:pPr algn="ctr"/>
+            <a:r>
+              <a:rPr lang="en-US" sz="1200" dirty="0"/>
+              <a:t>Federal Highway Administration Fees</a:t>
+            </a:r>
+          </a:p>
+        </p:txBody>
+      </p:sp>
+      <p:sp>
+        <p:nvSpPr>
+          <p:cNvPr id="378" name="Rectangle: Rounded Corners 377">
+            <a:extLst>
+              <a:ext uri="{FF2B5EF4-FFF2-40B4-BE49-F238E27FC236}">
+                <a16:creationId xmlns:a16="http://schemas.microsoft.com/office/drawing/2014/main" id="{23C22559-00A3-4D07-B2FB-16E91CB2B6A8}"/>
+              </a:ext>
+            </a:extLst>
+          </p:cNvPr>
+          <p:cNvSpPr/>
+          <p:nvPr/>
+        </p:nvSpPr>
+        <p:spPr>
+          <a:xfrm>
+            <a:off x="1420378" y="4859312"/>
+            <a:ext cx="1493951" cy="477107"/>
+          </a:xfrm>
+          <a:prstGeom prst="roundRect">
+            <a:avLst/>
+          </a:prstGeom>
+          <a:solidFill>
+            <a:schemeClr val="accent6">
+              <a:lumMod val="40000"/>
+              <a:lumOff val="60000"/>
+            </a:schemeClr>
+          </a:solidFill>
+          <a:ln w="19050">
+            <a:solidFill>
+              <a:schemeClr val="tx1"/>
+            </a:solidFill>
+          </a:ln>
+        </p:spPr>
+        <p:style>
+          <a:lnRef idx="2">
+            <a:schemeClr val="accent6"/>
+          </a:lnRef>
+          <a:fillRef idx="1">
+            <a:schemeClr val="lt1"/>
+          </a:fillRef>
+          <a:effectRef idx="0">
+            <a:schemeClr val="accent6"/>
+          </a:effectRef>
+          <a:fontRef idx="minor">
+            <a:schemeClr val="dk1"/>
+          </a:fontRef>
+        </p:style>
+        <p:txBody>
+          <a:bodyPr rtlCol="0" anchor="ctr"/>
+          <a:lstStyle/>
+          <a:p>
+            <a:pPr algn="ctr"/>
+            <a:r>
+              <a:rPr lang="en-US" sz="1200" dirty="0"/>
+              <a:t>Rural Transportation</a:t>
+            </a:r>
+          </a:p>
+          <a:p>
+            <a:pPr algn="ctr"/>
+            <a:r>
+              <a:rPr lang="en-US" sz="1200" dirty="0"/>
+              <a:t>NAICS6, FIPS</a:t>
+            </a:r>
+          </a:p>
+        </p:txBody>
+      </p:sp>
+      <p:cxnSp>
+        <p:nvCxnSpPr>
+          <p:cNvPr id="379" name="Connector: Elbow 378">
+            <a:extLst>
+              <a:ext uri="{FF2B5EF4-FFF2-40B4-BE49-F238E27FC236}">
+                <a16:creationId xmlns:a16="http://schemas.microsoft.com/office/drawing/2014/main" id="{C470C9F1-8A8B-4676-92C8-0494B33A1573}"/>
+              </a:ext>
+            </a:extLst>
+          </p:cNvPr>
+          <p:cNvCxnSpPr>
+            <a:cxnSpLocks/>
+            <a:stCxn id="22" idx="2"/>
+            <a:endCxn id="378" idx="0"/>
+          </p:cNvCxnSpPr>
+          <p:nvPr/>
+        </p:nvCxnSpPr>
+        <p:spPr>
+          <a:xfrm rot="5400000">
+            <a:off x="2223404" y="2342498"/>
+            <a:ext cx="2460765" cy="2572863"/>
+          </a:xfrm>
+          <a:prstGeom prst="bentConnector3">
+            <a:avLst>
+              <a:gd name="adj1" fmla="val 12204"/>
+            </a:avLst>
+          </a:prstGeom>
+          <a:ln>
+            <a:solidFill>
+              <a:schemeClr val="tx1"/>
+            </a:solidFill>
+            <a:tailEnd type="triangle"/>
+          </a:ln>
+        </p:spPr>
+        <p:style>
+          <a:lnRef idx="1">
+            <a:schemeClr val="accent1"/>
+          </a:lnRef>
+          <a:fillRef idx="0">
+            <a:schemeClr val="accent1"/>
+          </a:fillRef>
+          <a:effectRef idx="0">
+            <a:schemeClr val="accent1"/>
+          </a:effectRef>
+          <a:fontRef idx="minor">
+            <a:schemeClr val="tx1"/>
+          </a:fontRef>
+        </p:style>
+      </p:cxnSp>
+      <p:cxnSp>
+        <p:nvCxnSpPr>
+          <p:cNvPr id="384" name="Connector: Elbow 383">
+            <a:extLst>
+              <a:ext uri="{FF2B5EF4-FFF2-40B4-BE49-F238E27FC236}">
+                <a16:creationId xmlns:a16="http://schemas.microsoft.com/office/drawing/2014/main" id="{A6C0A091-6D74-48D8-AFEB-220645114B5A}"/>
+              </a:ext>
+            </a:extLst>
+          </p:cNvPr>
+          <p:cNvCxnSpPr>
+            <a:cxnSpLocks/>
+            <a:stCxn id="377" idx="1"/>
+            <a:endCxn id="378" idx="0"/>
+          </p:cNvCxnSpPr>
+          <p:nvPr/>
+        </p:nvCxnSpPr>
+        <p:spPr>
+          <a:xfrm rot="10800000" flipV="1">
+            <a:off x="2167354" y="3326660"/>
+            <a:ext cx="483642" cy="1532652"/>
+          </a:xfrm>
+          <a:prstGeom prst="bentConnector2">
+            <a:avLst/>
+          </a:prstGeom>
+          <a:ln>
+            <a:solidFill>
+              <a:schemeClr val="tx1"/>
+            </a:solidFill>
+            <a:tailEnd type="triangle"/>
+          </a:ln>
+        </p:spPr>
+        <p:style>
+          <a:lnRef idx="1">
+            <a:schemeClr val="accent1"/>
+          </a:lnRef>
+          <a:fillRef idx="0">
+            <a:schemeClr val="accent1"/>
+          </a:fillRef>
+          <a:effectRef idx="0">
+            <a:schemeClr val="accent1"/>
+          </a:effectRef>
+          <a:fontRef idx="minor">
+            <a:schemeClr val="tx1"/>
+          </a:fontRef>
+        </p:style>
+      </p:cxnSp>
+      <p:cxnSp>
+        <p:nvCxnSpPr>
+          <p:cNvPr id="387" name="Connector: Elbow 386">
+            <a:extLst>
+              <a:ext uri="{FF2B5EF4-FFF2-40B4-BE49-F238E27FC236}">
+                <a16:creationId xmlns:a16="http://schemas.microsoft.com/office/drawing/2014/main" id="{2D64C9ED-FA50-472A-8D42-6111843ADD44}"/>
+              </a:ext>
+            </a:extLst>
+          </p:cNvPr>
+          <p:cNvCxnSpPr>
+            <a:cxnSpLocks/>
+            <a:stCxn id="376" idx="1"/>
+            <a:endCxn id="378" idx="0"/>
+          </p:cNvCxnSpPr>
+          <p:nvPr/>
+        </p:nvCxnSpPr>
+        <p:spPr>
+          <a:xfrm rot="10800000" flipV="1">
+            <a:off x="2167354" y="4302156"/>
+            <a:ext cx="487794" cy="557156"/>
+          </a:xfrm>
+          <a:prstGeom prst="bentConnector2">
+            <a:avLst/>
+          </a:prstGeom>
+          <a:ln>
+            <a:solidFill>
+              <a:schemeClr val="tx1"/>
+            </a:solidFill>
+            <a:tailEnd type="triangle"/>
+          </a:ln>
+        </p:spPr>
+        <p:style>
+          <a:lnRef idx="1">
+            <a:schemeClr val="accent1"/>
+          </a:lnRef>
+          <a:fillRef idx="0">
+            <a:schemeClr val="accent1"/>
+          </a:fillRef>
+          <a:effectRef idx="0">
+            <a:schemeClr val="accent1"/>
+          </a:effectRef>
+          <a:fontRef idx="minor">
+            <a:schemeClr val="tx1"/>
+          </a:fontRef>
+        </p:style>
+      </p:cxnSp>
+      <p:sp>
+        <p:nvSpPr>
+          <p:cNvPr id="390" name="Rectangle: Rounded Corners 389">
+            <a:extLst>
+              <a:ext uri="{FF2B5EF4-FFF2-40B4-BE49-F238E27FC236}">
+                <a16:creationId xmlns:a16="http://schemas.microsoft.com/office/drawing/2014/main" id="{5B3A7D9B-1034-41D0-845F-DFCB5A15D789}"/>
+              </a:ext>
+            </a:extLst>
+          </p:cNvPr>
+          <p:cNvSpPr/>
+          <p:nvPr/>
+        </p:nvSpPr>
+        <p:spPr>
+          <a:xfrm>
+            <a:off x="5060739" y="3539501"/>
+            <a:ext cx="1311216" cy="461119"/>
+          </a:xfrm>
+          <a:prstGeom prst="roundRect">
+            <a:avLst/>
+          </a:prstGeom>
+          <a:ln>
+            <a:solidFill>
+              <a:schemeClr val="tx1"/>
+            </a:solidFill>
+          </a:ln>
+        </p:spPr>
+        <p:style>
+          <a:lnRef idx="2">
+            <a:schemeClr val="accent6"/>
+          </a:lnRef>
+          <a:fillRef idx="1">
+            <a:schemeClr val="lt1"/>
+          </a:fillRef>
+          <a:effectRef idx="0">
+            <a:schemeClr val="accent6"/>
+          </a:effectRef>
+          <a:fontRef idx="minor">
+            <a:schemeClr val="dk1"/>
+          </a:fontRef>
+        </p:style>
+        <p:txBody>
+          <a:bodyPr rtlCol="0" anchor="ctr"/>
+          <a:lstStyle/>
+          <a:p>
+            <a:pPr algn="ctr"/>
+            <a:r>
+              <a:rPr lang="en-US" sz="1200" dirty="0"/>
+              <a:t>American Housing Survey</a:t>
+            </a:r>
+          </a:p>
+        </p:txBody>
+      </p:sp>
+      <p:sp>
+        <p:nvSpPr>
+          <p:cNvPr id="391" name="Rectangle: Rounded Corners 390">
+            <a:extLst>
+              <a:ext uri="{FF2B5EF4-FFF2-40B4-BE49-F238E27FC236}">
+                <a16:creationId xmlns:a16="http://schemas.microsoft.com/office/drawing/2014/main" id="{D0F4EF65-ACC0-4011-A8ED-4F3492A972E4}"/>
+              </a:ext>
+            </a:extLst>
+          </p:cNvPr>
+          <p:cNvSpPr/>
+          <p:nvPr/>
+        </p:nvSpPr>
+        <p:spPr>
+          <a:xfrm>
+            <a:off x="6179638" y="2732979"/>
+            <a:ext cx="1184583" cy="710477"/>
+          </a:xfrm>
+          <a:prstGeom prst="roundRect">
+            <a:avLst/>
+          </a:prstGeom>
+          <a:ln>
+            <a:solidFill>
+              <a:schemeClr val="tx1"/>
+            </a:solidFill>
+          </a:ln>
+        </p:spPr>
+        <p:style>
+          <a:lnRef idx="2">
+            <a:schemeClr val="accent6"/>
+          </a:lnRef>
+          <a:fillRef idx="1">
+            <a:schemeClr val="lt1"/>
+          </a:fillRef>
+          <a:effectRef idx="0">
+            <a:schemeClr val="accent6"/>
+          </a:effectRef>
+          <a:fontRef idx="minor">
+            <a:schemeClr val="dk1"/>
+          </a:fontRef>
+        </p:style>
+        <p:txBody>
+          <a:bodyPr rtlCol="0" anchor="ctr"/>
+          <a:lstStyle/>
+          <a:p>
+            <a:pPr algn="ctr"/>
+            <a:r>
+              <a:rPr lang="en-US" sz="1200" dirty="0"/>
+              <a:t>Land Use assumptions for open space</a:t>
+            </a:r>
+          </a:p>
+        </p:txBody>
+      </p:sp>
+      <p:sp>
+        <p:nvSpPr>
+          <p:cNvPr id="392" name="Rectangle: Rounded Corners 391">
+            <a:extLst>
+              <a:ext uri="{FF2B5EF4-FFF2-40B4-BE49-F238E27FC236}">
+                <a16:creationId xmlns:a16="http://schemas.microsoft.com/office/drawing/2014/main" id="{827739D6-3B5A-4403-B511-4A735066D2C7}"/>
+              </a:ext>
+            </a:extLst>
+          </p:cNvPr>
+          <p:cNvSpPr/>
+          <p:nvPr/>
+        </p:nvSpPr>
+        <p:spPr>
+          <a:xfrm>
+            <a:off x="3884875" y="5427719"/>
+            <a:ext cx="1493951" cy="477107"/>
+          </a:xfrm>
+          <a:prstGeom prst="roundRect">
+            <a:avLst/>
+          </a:prstGeom>
+          <a:solidFill>
+            <a:schemeClr val="accent6">
+              <a:lumMod val="40000"/>
+              <a:lumOff val="60000"/>
+            </a:schemeClr>
+          </a:solidFill>
+          <a:ln w="19050">
+            <a:solidFill>
+              <a:schemeClr val="tx1"/>
+            </a:solidFill>
+          </a:ln>
+        </p:spPr>
+        <p:style>
+          <a:lnRef idx="2">
+            <a:schemeClr val="accent6"/>
+          </a:lnRef>
+          <a:fillRef idx="1">
+            <a:schemeClr val="lt1"/>
+          </a:fillRef>
+          <a:effectRef idx="0">
+            <a:schemeClr val="accent6"/>
+          </a:effectRef>
+          <a:fontRef idx="minor">
+            <a:schemeClr val="dk1"/>
+          </a:fontRef>
+        </p:style>
+        <p:txBody>
+          <a:bodyPr rtlCol="0" anchor="ctr"/>
+          <a:lstStyle/>
+          <a:p>
+            <a:pPr algn="ctr"/>
+            <a:r>
+              <a:rPr lang="en-US" sz="1200" dirty="0"/>
+              <a:t>Urban Areas</a:t>
+            </a:r>
+          </a:p>
+          <a:p>
+            <a:pPr algn="ctr"/>
+            <a:r>
+              <a:rPr lang="en-US" sz="1200" dirty="0"/>
+              <a:t>NAICS6, FIPS</a:t>
+            </a:r>
+          </a:p>
+        </p:txBody>
+      </p:sp>
+      <p:cxnSp>
+        <p:nvCxnSpPr>
+          <p:cNvPr id="393" name="Connector: Elbow 392">
+            <a:extLst>
+              <a:ext uri="{FF2B5EF4-FFF2-40B4-BE49-F238E27FC236}">
+                <a16:creationId xmlns:a16="http://schemas.microsoft.com/office/drawing/2014/main" id="{AF2CC2B8-6CA8-4DE7-BAFF-8AABFCB1E2CD}"/>
+              </a:ext>
+            </a:extLst>
+          </p:cNvPr>
+          <p:cNvCxnSpPr>
+            <a:cxnSpLocks/>
+            <a:stCxn id="20" idx="2"/>
+            <a:endCxn id="392" idx="0"/>
+          </p:cNvCxnSpPr>
+          <p:nvPr/>
+        </p:nvCxnSpPr>
+        <p:spPr>
+          <a:xfrm rot="5400000">
+            <a:off x="3840887" y="3175235"/>
+            <a:ext cx="3043448" cy="1461520"/>
+          </a:xfrm>
+          <a:prstGeom prst="bentConnector3">
+            <a:avLst>
+              <a:gd name="adj1" fmla="val 13556"/>
+            </a:avLst>
+          </a:prstGeom>
+          <a:ln>
+            <a:solidFill>
+              <a:schemeClr val="tx1"/>
+            </a:solidFill>
+            <a:tailEnd type="triangle"/>
+          </a:ln>
+        </p:spPr>
+        <p:style>
+          <a:lnRef idx="1">
+            <a:schemeClr val="accent1"/>
+          </a:lnRef>
+          <a:fillRef idx="0">
+            <a:schemeClr val="accent1"/>
+          </a:fillRef>
+          <a:effectRef idx="0">
+            <a:schemeClr val="accent1"/>
+          </a:effectRef>
+          <a:fontRef idx="minor">
+            <a:schemeClr val="tx1"/>
+          </a:fontRef>
+        </p:style>
+      </p:cxnSp>
+      <p:cxnSp>
+        <p:nvCxnSpPr>
+          <p:cNvPr id="396" name="Connector: Elbow 395">
+            <a:extLst>
+              <a:ext uri="{FF2B5EF4-FFF2-40B4-BE49-F238E27FC236}">
+                <a16:creationId xmlns:a16="http://schemas.microsoft.com/office/drawing/2014/main" id="{D1975AEA-8B62-42D0-8B11-D204AFEB2B6C}"/>
+              </a:ext>
+            </a:extLst>
+          </p:cNvPr>
+          <p:cNvCxnSpPr>
+            <a:cxnSpLocks/>
+            <a:stCxn id="377" idx="3"/>
+            <a:endCxn id="392" idx="0"/>
+          </p:cNvCxnSpPr>
+          <p:nvPr/>
+        </p:nvCxnSpPr>
+        <p:spPr>
+          <a:xfrm>
+            <a:off x="3962212" y="3326660"/>
+            <a:ext cx="669639" cy="2101059"/>
+          </a:xfrm>
+          <a:prstGeom prst="bentConnector2">
+            <a:avLst/>
+          </a:prstGeom>
+          <a:ln>
+            <a:solidFill>
+              <a:schemeClr val="tx1"/>
+            </a:solidFill>
+            <a:tailEnd type="triangle"/>
+          </a:ln>
+        </p:spPr>
+        <p:style>
+          <a:lnRef idx="1">
+            <a:schemeClr val="accent1"/>
+          </a:lnRef>
+          <a:fillRef idx="0">
+            <a:schemeClr val="accent1"/>
+          </a:fillRef>
+          <a:effectRef idx="0">
+            <a:schemeClr val="accent1"/>
+          </a:effectRef>
+          <a:fontRef idx="minor">
+            <a:schemeClr val="tx1"/>
+          </a:fontRef>
+        </p:style>
+      </p:cxnSp>
+      <p:cxnSp>
+        <p:nvCxnSpPr>
+          <p:cNvPr id="399" name="Connector: Elbow 398">
+            <a:extLst>
+              <a:ext uri="{FF2B5EF4-FFF2-40B4-BE49-F238E27FC236}">
+                <a16:creationId xmlns:a16="http://schemas.microsoft.com/office/drawing/2014/main" id="{FB3AA2C0-55B6-44AC-BBC8-B0609F93184A}"/>
+              </a:ext>
+            </a:extLst>
+          </p:cNvPr>
+          <p:cNvCxnSpPr>
+            <a:cxnSpLocks/>
+            <a:stCxn id="376" idx="3"/>
+            <a:endCxn id="392" idx="0"/>
+          </p:cNvCxnSpPr>
+          <p:nvPr/>
+        </p:nvCxnSpPr>
+        <p:spPr>
+          <a:xfrm>
+            <a:off x="3966364" y="4302156"/>
+            <a:ext cx="665487" cy="1125563"/>
+          </a:xfrm>
+          <a:prstGeom prst="bentConnector2">
+            <a:avLst/>
+          </a:prstGeom>
+          <a:ln>
+            <a:solidFill>
+              <a:schemeClr val="tx1"/>
+            </a:solidFill>
+            <a:tailEnd type="triangle"/>
+          </a:ln>
+        </p:spPr>
+        <p:style>
+          <a:lnRef idx="1">
+            <a:schemeClr val="accent1"/>
+          </a:lnRef>
+          <a:fillRef idx="0">
+            <a:schemeClr val="accent1"/>
+          </a:fillRef>
+          <a:effectRef idx="0">
+            <a:schemeClr val="accent1"/>
+          </a:effectRef>
+          <a:fontRef idx="minor">
+            <a:schemeClr val="tx1"/>
+          </a:fontRef>
+        </p:style>
+      </p:cxnSp>
+      <p:cxnSp>
+        <p:nvCxnSpPr>
+          <p:cNvPr id="402" name="Connector: Elbow 401">
+            <a:extLst>
+              <a:ext uri="{FF2B5EF4-FFF2-40B4-BE49-F238E27FC236}">
+                <a16:creationId xmlns:a16="http://schemas.microsoft.com/office/drawing/2014/main" id="{A2FD9137-0BB0-482C-8314-317D90B44ECC}"/>
+              </a:ext>
+            </a:extLst>
+          </p:cNvPr>
+          <p:cNvCxnSpPr>
+            <a:cxnSpLocks/>
+            <a:stCxn id="390" idx="1"/>
+            <a:endCxn id="392" idx="0"/>
+          </p:cNvCxnSpPr>
+          <p:nvPr/>
+        </p:nvCxnSpPr>
+        <p:spPr>
+          <a:xfrm rot="10800000" flipV="1">
+            <a:off x="4631851" y="3770061"/>
+            <a:ext cx="428888" cy="1657658"/>
+          </a:xfrm>
+          <a:prstGeom prst="bentConnector2">
+            <a:avLst/>
+          </a:prstGeom>
+          <a:ln>
+            <a:solidFill>
+              <a:schemeClr val="tx1"/>
+            </a:solidFill>
+            <a:tailEnd type="triangle"/>
+          </a:ln>
+        </p:spPr>
+        <p:style>
+          <a:lnRef idx="1">
+            <a:schemeClr val="accent1"/>
+          </a:lnRef>
+          <a:fillRef idx="0">
+            <a:schemeClr val="accent1"/>
+          </a:fillRef>
+          <a:effectRef idx="0">
+            <a:schemeClr val="accent1"/>
+          </a:effectRef>
+          <a:fontRef idx="minor">
+            <a:schemeClr val="tx1"/>
+          </a:fontRef>
+        </p:style>
+      </p:cxnSp>
+      <p:cxnSp>
+        <p:nvCxnSpPr>
+          <p:cNvPr id="405" name="Connector: Elbow 404">
+            <a:extLst>
+              <a:ext uri="{FF2B5EF4-FFF2-40B4-BE49-F238E27FC236}">
+                <a16:creationId xmlns:a16="http://schemas.microsoft.com/office/drawing/2014/main" id="{222DBF64-D8CC-45C8-91CC-3A72E976922F}"/>
+              </a:ext>
+            </a:extLst>
+          </p:cNvPr>
+          <p:cNvCxnSpPr>
+            <a:cxnSpLocks/>
+            <a:stCxn id="170" idx="1"/>
+            <a:endCxn id="392" idx="0"/>
+          </p:cNvCxnSpPr>
+          <p:nvPr/>
+        </p:nvCxnSpPr>
+        <p:spPr>
+          <a:xfrm rot="10800000" flipV="1">
+            <a:off x="4631851" y="4389071"/>
+            <a:ext cx="428888" cy="1038648"/>
+          </a:xfrm>
+          <a:prstGeom prst="bentConnector2">
+            <a:avLst/>
+          </a:prstGeom>
+          <a:ln>
+            <a:solidFill>
+              <a:schemeClr val="tx1"/>
+            </a:solidFill>
+            <a:tailEnd type="triangle"/>
+          </a:ln>
+        </p:spPr>
+        <p:style>
+          <a:lnRef idx="1">
+            <a:schemeClr val="accent1"/>
+          </a:lnRef>
+          <a:fillRef idx="0">
+            <a:schemeClr val="accent1"/>
+          </a:fillRef>
+          <a:effectRef idx="0">
+            <a:schemeClr val="accent1"/>
+          </a:effectRef>
+          <a:fontRef idx="minor">
+            <a:schemeClr val="tx1"/>
+          </a:fontRef>
+        </p:style>
+      </p:cxnSp>
+      <p:cxnSp>
+        <p:nvCxnSpPr>
+          <p:cNvPr id="408" name="Connector: Elbow 407">
+            <a:extLst>
+              <a:ext uri="{FF2B5EF4-FFF2-40B4-BE49-F238E27FC236}">
+                <a16:creationId xmlns:a16="http://schemas.microsoft.com/office/drawing/2014/main" id="{ECF38BA9-D9E2-4C11-AF48-6641855141A9}"/>
+              </a:ext>
+            </a:extLst>
+          </p:cNvPr>
+          <p:cNvCxnSpPr>
+            <a:cxnSpLocks/>
+            <a:stCxn id="169" idx="1"/>
+            <a:endCxn id="392" idx="0"/>
+          </p:cNvCxnSpPr>
+          <p:nvPr/>
+        </p:nvCxnSpPr>
+        <p:spPr>
+          <a:xfrm rot="10800000" flipV="1">
+            <a:off x="4631852" y="5014085"/>
+            <a:ext cx="428889" cy="413634"/>
+          </a:xfrm>
+          <a:prstGeom prst="bentConnector2">
+            <a:avLst/>
+          </a:prstGeom>
+          <a:ln>
+            <a:solidFill>
+              <a:schemeClr val="tx1"/>
+            </a:solidFill>
+            <a:tailEnd type="triangle"/>
+          </a:ln>
+        </p:spPr>
+        <p:style>
+          <a:lnRef idx="1">
+            <a:schemeClr val="accent1"/>
+          </a:lnRef>
+          <a:fillRef idx="0">
+            <a:schemeClr val="accent1"/>
+          </a:fillRef>
+          <a:effectRef idx="0">
+            <a:schemeClr val="accent1"/>
+          </a:effectRef>
+          <a:fontRef idx="minor">
+            <a:schemeClr val="tx1"/>
+          </a:fontRef>
+        </p:style>
+      </p:cxnSp>
+      <p:cxnSp>
+        <p:nvCxnSpPr>
+          <p:cNvPr id="411" name="Connector: Elbow 410">
+            <a:extLst>
+              <a:ext uri="{FF2B5EF4-FFF2-40B4-BE49-F238E27FC236}">
+                <a16:creationId xmlns:a16="http://schemas.microsoft.com/office/drawing/2014/main" id="{3EB5A64D-F181-4FAA-9AA7-7D8219E58EC1}"/>
+              </a:ext>
+            </a:extLst>
+          </p:cNvPr>
+          <p:cNvCxnSpPr>
+            <a:cxnSpLocks/>
+            <a:stCxn id="391" idx="1"/>
+            <a:endCxn id="392" idx="0"/>
+          </p:cNvCxnSpPr>
+          <p:nvPr/>
+        </p:nvCxnSpPr>
+        <p:spPr>
+          <a:xfrm rot="10800000" flipV="1">
+            <a:off x="4631852" y="3088217"/>
+            <a:ext cx="1547787" cy="2339501"/>
+          </a:xfrm>
+          <a:prstGeom prst="bentConnector2">
+            <a:avLst/>
+          </a:prstGeom>
+          <a:ln>
+            <a:solidFill>
+              <a:schemeClr val="tx1"/>
+            </a:solidFill>
+            <a:tailEnd type="triangle"/>
+          </a:ln>
+        </p:spPr>
+        <p:style>
+          <a:lnRef idx="1">
+            <a:schemeClr val="accent1"/>
+          </a:lnRef>
+          <a:fillRef idx="0">
+            <a:schemeClr val="accent1"/>
+          </a:fillRef>
+          <a:effectRef idx="0">
+            <a:schemeClr val="accent1"/>
+          </a:effectRef>
+          <a:fontRef idx="minor">
+            <a:schemeClr val="tx1"/>
+          </a:fontRef>
+        </p:style>
+      </p:cxnSp>
+      <p:cxnSp>
+        <p:nvCxnSpPr>
+          <p:cNvPr id="1349" name="Straight Arrow Connector 1348">
+            <a:extLst>
+              <a:ext uri="{FF2B5EF4-FFF2-40B4-BE49-F238E27FC236}">
+                <a16:creationId xmlns:a16="http://schemas.microsoft.com/office/drawing/2014/main" id="{1AD6167D-EE2D-4310-B7C4-A926EA9622DB}"/>
+              </a:ext>
+            </a:extLst>
+          </p:cNvPr>
+          <p:cNvCxnSpPr>
+            <a:cxnSpLocks/>
+            <a:stCxn id="227" idx="1"/>
+            <a:endCxn id="559" idx="3"/>
+          </p:cNvCxnSpPr>
+          <p:nvPr/>
+        </p:nvCxnSpPr>
+        <p:spPr>
+          <a:xfrm flipH="1">
+            <a:off x="3856715" y="6333522"/>
+            <a:ext cx="5925834" cy="1"/>
+          </a:xfrm>
+          <a:prstGeom prst="straightConnector1">
+            <a:avLst/>
+          </a:prstGeom>
+          <a:ln w="6350">
+            <a:solidFill>
+              <a:schemeClr val="tx1"/>
+            </a:solidFill>
+            <a:tailEnd type="triangle"/>
+          </a:ln>
+        </p:spPr>
+        <p:style>
+          <a:lnRef idx="1">
+            <a:schemeClr val="accent1"/>
+          </a:lnRef>
+          <a:fillRef idx="0">
+            <a:schemeClr val="accent1"/>
+          </a:fillRef>
+          <a:effectRef idx="0">
+            <a:schemeClr val="accent1"/>
+          </a:effectRef>
+          <a:fontRef idx="minor">
+            <a:schemeClr val="tx1"/>
+          </a:fontRef>
+        </p:style>
+      </p:cxnSp>
+      <p:cxnSp>
+        <p:nvCxnSpPr>
+          <p:cNvPr id="640" name="Connector: Elbow 639">
+            <a:extLst>
+              <a:ext uri="{FF2B5EF4-FFF2-40B4-BE49-F238E27FC236}">
+                <a16:creationId xmlns:a16="http://schemas.microsoft.com/office/drawing/2014/main" id="{A82B0DCE-8C22-4DA8-8CBB-8A8850367849}"/>
+              </a:ext>
+            </a:extLst>
+          </p:cNvPr>
+          <p:cNvCxnSpPr>
+            <a:cxnSpLocks/>
+            <a:stCxn id="85" idx="2"/>
+            <a:endCxn id="227" idx="3"/>
+          </p:cNvCxnSpPr>
+          <p:nvPr/>
+        </p:nvCxnSpPr>
+        <p:spPr>
+          <a:xfrm rot="5400000">
+            <a:off x="9352092" y="4195386"/>
+            <a:ext cx="3925711" cy="350560"/>
+          </a:xfrm>
+          <a:prstGeom prst="bentConnector2">
+            <a:avLst/>
+          </a:prstGeom>
+          <a:ln>
+            <a:solidFill>
+              <a:schemeClr val="tx1"/>
+            </a:solidFill>
+            <a:tailEnd type="triangle"/>
+          </a:ln>
+        </p:spPr>
+        <p:style>
+          <a:lnRef idx="1">
+            <a:schemeClr val="accent1"/>
+          </a:lnRef>
+          <a:fillRef idx="0">
+            <a:schemeClr val="accent1"/>
+          </a:fillRef>
+          <a:effectRef idx="0">
+            <a:schemeClr val="accent1"/>
+          </a:effectRef>
+          <a:fontRef idx="minor">
+            <a:schemeClr val="tx1"/>
+          </a:fontRef>
+        </p:style>
+      </p:cxnSp>
+      <p:sp>
+        <p:nvSpPr>
+          <p:cNvPr id="672" name="Rectangle: Rounded Corners 671">
+            <a:extLst>
+              <a:ext uri="{FF2B5EF4-FFF2-40B4-BE49-F238E27FC236}">
+                <a16:creationId xmlns:a16="http://schemas.microsoft.com/office/drawing/2014/main" id="{6EB9AA6A-FA02-44DE-AC87-D200C4815696}"/>
+              </a:ext>
+            </a:extLst>
+          </p:cNvPr>
+          <p:cNvSpPr/>
+          <p:nvPr/>
+        </p:nvSpPr>
+        <p:spPr>
+          <a:xfrm>
+            <a:off x="7809118" y="5519646"/>
+            <a:ext cx="1493951" cy="477107"/>
+          </a:xfrm>
+          <a:prstGeom prst="roundRect">
+            <a:avLst/>
+          </a:prstGeom>
+          <a:solidFill>
+            <a:schemeClr val="accent6">
+              <a:lumMod val="40000"/>
+              <a:lumOff val="60000"/>
+            </a:schemeClr>
+          </a:solidFill>
+          <a:ln w="19050">
+            <a:solidFill>
+              <a:schemeClr val="tx1"/>
+            </a:solidFill>
+          </a:ln>
+        </p:spPr>
+        <p:style>
+          <a:lnRef idx="2">
+            <a:schemeClr val="accent6"/>
+          </a:lnRef>
+          <a:fillRef idx="1">
+            <a:schemeClr val="lt1"/>
+          </a:fillRef>
+          <a:effectRef idx="0">
+            <a:schemeClr val="accent6"/>
+          </a:effectRef>
+          <a:fontRef idx="minor">
+            <a:schemeClr val="dk1"/>
+          </a:fontRef>
+        </p:style>
+        <p:txBody>
+          <a:bodyPr rtlCol="0" anchor="ctr"/>
+          <a:lstStyle/>
+          <a:p>
+            <a:pPr algn="ctr"/>
+            <a:r>
+              <a:rPr lang="en-US" sz="1200" dirty="0"/>
+              <a:t>Mining, Rural Res.</a:t>
+            </a:r>
+          </a:p>
+          <a:p>
+            <a:pPr algn="ctr"/>
+            <a:r>
+              <a:rPr lang="en-US" sz="1200" dirty="0"/>
+              <a:t>NAICS6, FIPS</a:t>
+            </a:r>
+          </a:p>
+        </p:txBody>
+      </p:sp>
+      <p:cxnSp>
+        <p:nvCxnSpPr>
+          <p:cNvPr id="673" name="Connector: Elbow 672">
+            <a:extLst>
+              <a:ext uri="{FF2B5EF4-FFF2-40B4-BE49-F238E27FC236}">
+                <a16:creationId xmlns:a16="http://schemas.microsoft.com/office/drawing/2014/main" id="{8F8F56C6-5658-4F57-8C97-4AB722E6F184}"/>
+              </a:ext>
+            </a:extLst>
+          </p:cNvPr>
+          <p:cNvCxnSpPr>
+            <a:cxnSpLocks/>
+            <a:stCxn id="21" idx="2"/>
+            <a:endCxn id="672" idx="0"/>
+          </p:cNvCxnSpPr>
+          <p:nvPr/>
+        </p:nvCxnSpPr>
+        <p:spPr>
+          <a:xfrm rot="16200000" flipH="1">
+            <a:off x="6436082" y="3399634"/>
+            <a:ext cx="3128238" cy="1111785"/>
+          </a:xfrm>
+          <a:prstGeom prst="bentConnector3">
+            <a:avLst>
+              <a:gd name="adj1" fmla="val 11118"/>
+            </a:avLst>
+          </a:prstGeom>
+          <a:ln>
+            <a:solidFill>
+              <a:schemeClr val="tx1"/>
+            </a:solidFill>
+            <a:tailEnd type="triangle"/>
+          </a:ln>
+        </p:spPr>
+        <p:style>
+          <a:lnRef idx="1">
+            <a:schemeClr val="accent1"/>
+          </a:lnRef>
+          <a:fillRef idx="0">
+            <a:schemeClr val="accent1"/>
+          </a:fillRef>
+          <a:effectRef idx="0">
+            <a:schemeClr val="accent1"/>
+          </a:effectRef>
+          <a:fontRef idx="minor">
+            <a:schemeClr val="tx1"/>
+          </a:fontRef>
+        </p:style>
+      </p:cxnSp>
+      <p:cxnSp>
+        <p:nvCxnSpPr>
+          <p:cNvPr id="674" name="Connector: Elbow 673">
+            <a:extLst>
+              <a:ext uri="{FF2B5EF4-FFF2-40B4-BE49-F238E27FC236}">
+                <a16:creationId xmlns:a16="http://schemas.microsoft.com/office/drawing/2014/main" id="{37ACFB78-B148-492C-A578-F189DB837CB7}"/>
+              </a:ext>
+            </a:extLst>
+          </p:cNvPr>
+          <p:cNvCxnSpPr>
+            <a:cxnSpLocks/>
+            <a:stCxn id="390" idx="3"/>
+            <a:endCxn id="672" idx="0"/>
+          </p:cNvCxnSpPr>
+          <p:nvPr/>
+        </p:nvCxnSpPr>
+        <p:spPr>
+          <a:xfrm>
+            <a:off x="6371955" y="3770061"/>
+            <a:ext cx="2184139" cy="1749585"/>
+          </a:xfrm>
+          <a:prstGeom prst="bentConnector2">
+            <a:avLst/>
+          </a:prstGeom>
+          <a:ln>
+            <a:solidFill>
+              <a:schemeClr val="tx1"/>
+            </a:solidFill>
+            <a:tailEnd type="triangle"/>
+          </a:ln>
+        </p:spPr>
+        <p:style>
+          <a:lnRef idx="1">
+            <a:schemeClr val="accent1"/>
+          </a:lnRef>
+          <a:fillRef idx="0">
+            <a:schemeClr val="accent1"/>
+          </a:fillRef>
+          <a:effectRef idx="0">
+            <a:schemeClr val="accent1"/>
+          </a:effectRef>
+          <a:fontRef idx="minor">
+            <a:schemeClr val="tx1"/>
+          </a:fontRef>
+        </p:style>
+      </p:cxnSp>
+      <p:cxnSp>
+        <p:nvCxnSpPr>
+          <p:cNvPr id="675" name="Connector: Elbow 674">
+            <a:extLst>
+              <a:ext uri="{FF2B5EF4-FFF2-40B4-BE49-F238E27FC236}">
+                <a16:creationId xmlns:a16="http://schemas.microsoft.com/office/drawing/2014/main" id="{7ACCE963-6EC2-4CCB-AF63-155B4DDAA2CF}"/>
+              </a:ext>
+            </a:extLst>
+          </p:cNvPr>
+          <p:cNvCxnSpPr>
+            <a:cxnSpLocks/>
+            <a:stCxn id="176" idx="3"/>
+            <a:endCxn id="672" idx="0"/>
+          </p:cNvCxnSpPr>
+          <p:nvPr/>
+        </p:nvCxnSpPr>
+        <p:spPr>
+          <a:xfrm>
+            <a:off x="8274859" y="5087912"/>
+            <a:ext cx="281235" cy="431734"/>
+          </a:xfrm>
+          <a:prstGeom prst="bentConnector2">
+            <a:avLst/>
+          </a:prstGeom>
+          <a:ln>
+            <a:solidFill>
+              <a:schemeClr val="tx1"/>
+            </a:solidFill>
+            <a:tailEnd type="triangle"/>
+          </a:ln>
+        </p:spPr>
+        <p:style>
+          <a:lnRef idx="1">
+            <a:schemeClr val="accent1"/>
+          </a:lnRef>
+          <a:fillRef idx="0">
+            <a:schemeClr val="accent1"/>
+          </a:fillRef>
+          <a:effectRef idx="0">
+            <a:schemeClr val="accent1"/>
+          </a:effectRef>
+          <a:fontRef idx="minor">
+            <a:schemeClr val="tx1"/>
+          </a:fontRef>
+        </p:style>
+      </p:cxnSp>
+      <p:cxnSp>
+        <p:nvCxnSpPr>
+          <p:cNvPr id="676" name="Connector: Elbow 675">
+            <a:extLst>
+              <a:ext uri="{FF2B5EF4-FFF2-40B4-BE49-F238E27FC236}">
+                <a16:creationId xmlns:a16="http://schemas.microsoft.com/office/drawing/2014/main" id="{9D6FA479-6000-41F0-9FFC-23A5E84688C1}"/>
+              </a:ext>
+            </a:extLst>
+          </p:cNvPr>
+          <p:cNvCxnSpPr>
+            <a:cxnSpLocks/>
+            <a:stCxn id="31" idx="1"/>
+            <a:endCxn id="170" idx="3"/>
+          </p:cNvCxnSpPr>
+          <p:nvPr/>
+        </p:nvCxnSpPr>
+        <p:spPr>
+          <a:xfrm rot="10800000" flipV="1">
+            <a:off x="6371955" y="4254657"/>
+            <a:ext cx="539412" cy="134413"/>
+          </a:xfrm>
+          <a:prstGeom prst="bentConnector3">
+            <a:avLst>
+              <a:gd name="adj1" fmla="val 50000"/>
+            </a:avLst>
+          </a:prstGeom>
+          <a:ln>
+            <a:solidFill>
+              <a:schemeClr val="tx1"/>
+            </a:solidFill>
+            <a:tailEnd type="triangle"/>
+          </a:ln>
+        </p:spPr>
+        <p:style>
+          <a:lnRef idx="1">
+            <a:schemeClr val="accent1"/>
+          </a:lnRef>
+          <a:fillRef idx="0">
+            <a:schemeClr val="accent1"/>
+          </a:fillRef>
+          <a:effectRef idx="0">
+            <a:schemeClr val="accent1"/>
+          </a:effectRef>
+          <a:fontRef idx="minor">
+            <a:schemeClr val="tx1"/>
+          </a:fontRef>
+        </p:style>
+      </p:cxnSp>
+      <p:cxnSp>
+        <p:nvCxnSpPr>
+          <p:cNvPr id="677" name="Connector: Elbow 676">
+            <a:extLst>
+              <a:ext uri="{FF2B5EF4-FFF2-40B4-BE49-F238E27FC236}">
+                <a16:creationId xmlns:a16="http://schemas.microsoft.com/office/drawing/2014/main" id="{3BD785EE-5C6A-4773-BAF3-0E84A045A7E6}"/>
+              </a:ext>
+            </a:extLst>
+          </p:cNvPr>
+          <p:cNvCxnSpPr>
+            <a:cxnSpLocks/>
+            <a:stCxn id="31" idx="1"/>
+            <a:endCxn id="169" idx="3"/>
+          </p:cNvCxnSpPr>
+          <p:nvPr/>
+        </p:nvCxnSpPr>
+        <p:spPr>
+          <a:xfrm rot="10800000" flipV="1">
+            <a:off x="6371957" y="4254657"/>
+            <a:ext cx="539411" cy="759427"/>
+          </a:xfrm>
+          <a:prstGeom prst="bentConnector3">
+            <a:avLst>
+              <a:gd name="adj1" fmla="val 50000"/>
+            </a:avLst>
+          </a:prstGeom>
+          <a:ln>
+            <a:solidFill>
+              <a:schemeClr val="tx1"/>
+            </a:solidFill>
+            <a:tailEnd type="triangle"/>
+          </a:ln>
+        </p:spPr>
+        <p:style>
+          <a:lnRef idx="1">
+            <a:schemeClr val="accent1"/>
+          </a:lnRef>
+          <a:fillRef idx="0">
+            <a:schemeClr val="accent1"/>
+          </a:fillRef>
+          <a:effectRef idx="0">
+            <a:schemeClr val="accent1"/>
+          </a:effectRef>
+          <a:fontRef idx="minor">
+            <a:schemeClr val="tx1"/>
+          </a:fontRef>
+        </p:style>
+      </p:cxnSp>
+      <p:cxnSp>
+        <p:nvCxnSpPr>
+          <p:cNvPr id="679" name="Connector: Elbow 678">
+            <a:extLst>
+              <a:ext uri="{FF2B5EF4-FFF2-40B4-BE49-F238E27FC236}">
+                <a16:creationId xmlns:a16="http://schemas.microsoft.com/office/drawing/2014/main" id="{4770F6EF-3E58-4886-9A1B-18E1BB8B06E0}"/>
+              </a:ext>
+            </a:extLst>
+          </p:cNvPr>
+          <p:cNvCxnSpPr>
+            <a:cxnSpLocks/>
+            <a:stCxn id="378" idx="2"/>
+            <a:endCxn id="559" idx="0"/>
+          </p:cNvCxnSpPr>
+          <p:nvPr/>
+        </p:nvCxnSpPr>
+        <p:spPr>
+          <a:xfrm rot="16200000" flipH="1">
+            <a:off x="2074411" y="5429361"/>
+            <a:ext cx="659710" cy="473825"/>
+          </a:xfrm>
+          <a:prstGeom prst="bentConnector3">
+            <a:avLst>
+              <a:gd name="adj1" fmla="val 50000"/>
+            </a:avLst>
+          </a:prstGeom>
+          <a:ln>
+            <a:solidFill>
+              <a:schemeClr val="tx1"/>
+            </a:solidFill>
+            <a:tailEnd type="triangle"/>
+          </a:ln>
+        </p:spPr>
+        <p:style>
+          <a:lnRef idx="1">
+            <a:schemeClr val="accent1"/>
+          </a:lnRef>
+          <a:fillRef idx="0">
+            <a:schemeClr val="accent1"/>
+          </a:fillRef>
+          <a:effectRef idx="0">
+            <a:schemeClr val="accent1"/>
+          </a:effectRef>
+          <a:fontRef idx="minor">
+            <a:schemeClr val="tx1"/>
+          </a:fontRef>
+        </p:style>
+      </p:cxnSp>
+      <p:cxnSp>
+        <p:nvCxnSpPr>
+          <p:cNvPr id="680" name="Connector: Elbow 679">
+            <a:extLst>
+              <a:ext uri="{FF2B5EF4-FFF2-40B4-BE49-F238E27FC236}">
+                <a16:creationId xmlns:a16="http://schemas.microsoft.com/office/drawing/2014/main" id="{7984671C-11A0-495D-8E0E-93D03DB392C8}"/>
+              </a:ext>
+            </a:extLst>
+          </p:cNvPr>
+          <p:cNvCxnSpPr>
+            <a:cxnSpLocks/>
+            <a:stCxn id="392" idx="1"/>
+            <a:endCxn id="559" idx="0"/>
+          </p:cNvCxnSpPr>
+          <p:nvPr/>
+        </p:nvCxnSpPr>
+        <p:spPr>
+          <a:xfrm rot="10800000" flipV="1">
+            <a:off x="2641179" y="5666273"/>
+            <a:ext cx="1243696" cy="329856"/>
+          </a:xfrm>
+          <a:prstGeom prst="bentConnector2">
+            <a:avLst/>
+          </a:prstGeom>
+          <a:ln>
+            <a:solidFill>
+              <a:schemeClr val="tx1"/>
+            </a:solidFill>
+            <a:tailEnd type="triangle"/>
+          </a:ln>
+        </p:spPr>
+        <p:style>
+          <a:lnRef idx="1">
+            <a:schemeClr val="accent1"/>
+          </a:lnRef>
+          <a:fillRef idx="0">
+            <a:schemeClr val="accent1"/>
+          </a:fillRef>
+          <a:effectRef idx="0">
+            <a:schemeClr val="accent1"/>
+          </a:effectRef>
+          <a:fontRef idx="minor">
+            <a:schemeClr val="tx1"/>
+          </a:fontRef>
+        </p:style>
+      </p:cxnSp>
+      <p:cxnSp>
+        <p:nvCxnSpPr>
+          <p:cNvPr id="682" name="Connector: Elbow 681">
+            <a:extLst>
+              <a:ext uri="{FF2B5EF4-FFF2-40B4-BE49-F238E27FC236}">
+                <a16:creationId xmlns:a16="http://schemas.microsoft.com/office/drawing/2014/main" id="{1FA9E151-219F-416C-86CC-49086713EE6E}"/>
+              </a:ext>
+            </a:extLst>
+          </p:cNvPr>
+          <p:cNvCxnSpPr>
+            <a:cxnSpLocks/>
+            <a:stCxn id="672" idx="2"/>
+            <a:endCxn id="559" idx="3"/>
+          </p:cNvCxnSpPr>
+          <p:nvPr/>
+        </p:nvCxnSpPr>
+        <p:spPr>
+          <a:xfrm rot="5400000">
+            <a:off x="6038020" y="3815449"/>
+            <a:ext cx="336770" cy="4699379"/>
+          </a:xfrm>
+          <a:prstGeom prst="bentConnector2">
+            <a:avLst/>
+          </a:prstGeom>
+          <a:ln>
+            <a:solidFill>
+              <a:schemeClr val="tx1"/>
+            </a:solidFill>
+            <a:tailEnd type="triangle"/>
+          </a:ln>
+        </p:spPr>
+        <p:style>
+          <a:lnRef idx="1">
+            <a:schemeClr val="accent1"/>
+          </a:lnRef>
+          <a:fillRef idx="0">
+            <a:schemeClr val="accent1"/>
+          </a:fillRef>
+          <a:effectRef idx="0">
+            <a:schemeClr val="accent1"/>
+          </a:effectRef>
+          <a:fontRef idx="minor">
+            <a:schemeClr val="tx1"/>
+          </a:fontRef>
+        </p:style>
+      </p:cxnSp>
+      <p:cxnSp>
+        <p:nvCxnSpPr>
+          <p:cNvPr id="704" name="Straight Arrow Connector 703">
+            <a:extLst>
+              <a:ext uri="{FF2B5EF4-FFF2-40B4-BE49-F238E27FC236}">
+                <a16:creationId xmlns:a16="http://schemas.microsoft.com/office/drawing/2014/main" id="{BE8940B4-9284-4392-BFA8-15A7511B4FF2}"/>
+              </a:ext>
+            </a:extLst>
+          </p:cNvPr>
+          <p:cNvCxnSpPr>
+            <a:cxnSpLocks/>
+            <a:stCxn id="31" idx="2"/>
+            <a:endCxn id="176" idx="0"/>
+          </p:cNvCxnSpPr>
+          <p:nvPr/>
+        </p:nvCxnSpPr>
+        <p:spPr>
+          <a:xfrm flipH="1">
+            <a:off x="7589059" y="4483258"/>
+            <a:ext cx="8108" cy="376054"/>
+          </a:xfrm>
+          <a:prstGeom prst="straightConnector1">
+            <a:avLst/>
+          </a:prstGeom>
+          <a:ln w="6350">
             <a:solidFill>
               <a:schemeClr val="tx1"/>
             </a:solidFill>
@@ -5877,55 +7730,10 @@
 
 <file path=customXml/item1.xml><?xml version="1.0" encoding="utf-8"?>
 <?mso-contentType ?>
-<FormTemplates xmlns="http://schemas.microsoft.com/sharepoint/v3/contenttype/forms">
-  <Display>DocumentLibraryForm</Display>
-  <Edit>DocumentLibraryForm</Edit>
-  <New>DocumentLibraryForm</New>
-</FormTemplates>
+<SharedContentType xmlns="Microsoft.SharePoint.Taxonomy.ContentTypeSync" SourceId="29f62856-1543-49d4-a736-4569d363f533" ContentTypeId="0x0101" PreviousValue="false"/>
 </file>
 
 <file path=customXml/item2.xml><?xml version="1.0" encoding="utf-8"?>
-<p:properties xmlns:p="http://schemas.microsoft.com/office/2006/metadata/properties" xmlns:xsi="http://www.w3.org/2001/XMLSchema-instance" xmlns:pc="http://schemas.microsoft.com/office/infopath/2007/PartnerControls">
-  <documentManagement>
-    <_Source xmlns="http://schemas.microsoft.com/sharepoint/v3/fields" xsi:nil="true"/>
-    <Language xmlns="http://schemas.microsoft.com/sharepoint/v3">English</Language>
-    <j747ac98061d40f0aa7bd47e1db5675d xmlns="4ffa91fb-a0ff-4ac5-b2db-65c790d184a4">
-      <Terms xmlns="http://schemas.microsoft.com/office/infopath/2007/PartnerControls"/>
-    </j747ac98061d40f0aa7bd47e1db5675d>
-    <External_x0020_Contributor xmlns="4ffa91fb-a0ff-4ac5-b2db-65c790d184a4" xsi:nil="true"/>
-    <TaxKeywordTaxHTField xmlns="4ffa91fb-a0ff-4ac5-b2db-65c790d184a4">
-      <Terms xmlns="http://schemas.microsoft.com/office/infopath/2007/PartnerControls"/>
-    </TaxKeywordTaxHTField>
-    <Records_x0020_Date xmlns="5c765a16-8853-4f98-a815-3aaad8dda3d1" xsi:nil="true"/>
-    <Record xmlns="4ffa91fb-a0ff-4ac5-b2db-65c790d184a4">Shared</Record>
-    <Rights xmlns="4ffa91fb-a0ff-4ac5-b2db-65c790d184a4" xsi:nil="true"/>
-    <Document_x0020_Creation_x0020_Date xmlns="4ffa91fb-a0ff-4ac5-b2db-65c790d184a4">2020-03-02T17:17:22+00:00</Document_x0020_Creation_x0020_Date>
-    <EPA_x0020_Office xmlns="4ffa91fb-a0ff-4ac5-b2db-65c790d184a4" xsi:nil="true"/>
-    <Records_x0020_Status xmlns="5c765a16-8853-4f98-a815-3aaad8dda3d1">Pending</Records_x0020_Status>
-    <CategoryDescription xmlns="http://schemas.microsoft.com/sharepoint.v3" xsi:nil="true"/>
-    <Identifier xmlns="4ffa91fb-a0ff-4ac5-b2db-65c790d184a4" xsi:nil="true"/>
-    <_Coverage xmlns="http://schemas.microsoft.com/sharepoint/v3/fields" xsi:nil="true"/>
-    <Creator xmlns="4ffa91fb-a0ff-4ac5-b2db-65c790d184a4">
-      <UserInfo>
-        <DisplayName/>
-        <AccountId xsi:nil="true"/>
-        <AccountType/>
-      </UserInfo>
-    </Creator>
-    <EPA_x0020_Related_x0020_Documents xmlns="4ffa91fb-a0ff-4ac5-b2db-65c790d184a4" xsi:nil="true"/>
-    <EPA_x0020_Contributor xmlns="4ffa91fb-a0ff-4ac5-b2db-65c790d184a4">
-      <UserInfo>
-        <DisplayName/>
-        <AccountId xsi:nil="true"/>
-        <AccountType/>
-      </UserInfo>
-    </EPA_x0020_Contributor>
-    <TaxCatchAll xmlns="4ffa91fb-a0ff-4ac5-b2db-65c790d184a4"/>
-  </documentManagement>
-</p:properties>
-</file>
-
-<file path=customXml/item3.xml><?xml version="1.0" encoding="utf-8"?>
 <ct:contentTypeSchema xmlns:ct="http://schemas.microsoft.com/office/2006/metadata/contentType" xmlns:ma="http://schemas.microsoft.com/office/2006/metadata/properties/metaAttributes" ct:_="" ma:_="" ma:contentTypeName="Document" ma:contentTypeID="0x010100955E275BD5E47A498812F45EBC36C1A3" ma:contentTypeVersion="12" ma:contentTypeDescription="Create a new document." ma:contentTypeScope="" ma:versionID="885430743dd78853695adb7ce87c6158">
   <xsd:schema xmlns:xsd="http://www.w3.org/2001/XMLSchema" xmlns:xs="http://www.w3.org/2001/XMLSchema" xmlns:p="http://schemas.microsoft.com/office/2006/metadata/properties" xmlns:ns1="http://schemas.microsoft.com/sharepoint/v3" xmlns:ns3="4ffa91fb-a0ff-4ac5-b2db-65c790d184a4" xmlns:ns4="http://schemas.microsoft.com/sharepoint.v3" xmlns:ns5="http://schemas.microsoft.com/sharepoint/v3/fields" xmlns:ns6="5c765a16-8853-4f98-a815-3aaad8dda3d1" xmlns:ns7="c4f5f859-d02f-4748-a7f3-bb258078b539" targetNamespace="http://schemas.microsoft.com/office/2006/metadata/properties" ma:root="true" ma:fieldsID="a2ca272637d9c66307f07f40fc8b5b2c" ns1:_="" ns3:_="" ns4:_="" ns5:_="" ns6:_="" ns7:_="">
     <xsd:import namespace="http://schemas.microsoft.com/sharepoint/v3"/>
@@ -6342,41 +8150,65 @@
 </ct:contentTypeSchema>
 </file>
 
+<file path=customXml/item3.xml><?xml version="1.0" encoding="utf-8"?>
+<p:properties xmlns:p="http://schemas.microsoft.com/office/2006/metadata/properties" xmlns:xsi="http://www.w3.org/2001/XMLSchema-instance" xmlns:pc="http://schemas.microsoft.com/office/infopath/2007/PartnerControls">
+  <documentManagement>
+    <_Source xmlns="http://schemas.microsoft.com/sharepoint/v3/fields" xsi:nil="true"/>
+    <Language xmlns="http://schemas.microsoft.com/sharepoint/v3">English</Language>
+    <j747ac98061d40f0aa7bd47e1db5675d xmlns="4ffa91fb-a0ff-4ac5-b2db-65c790d184a4">
+      <Terms xmlns="http://schemas.microsoft.com/office/infopath/2007/PartnerControls"/>
+    </j747ac98061d40f0aa7bd47e1db5675d>
+    <External_x0020_Contributor xmlns="4ffa91fb-a0ff-4ac5-b2db-65c790d184a4" xsi:nil="true"/>
+    <TaxKeywordTaxHTField xmlns="4ffa91fb-a0ff-4ac5-b2db-65c790d184a4">
+      <Terms xmlns="http://schemas.microsoft.com/office/infopath/2007/PartnerControls"/>
+    </TaxKeywordTaxHTField>
+    <Records_x0020_Date xmlns="5c765a16-8853-4f98-a815-3aaad8dda3d1" xsi:nil="true"/>
+    <Record xmlns="4ffa91fb-a0ff-4ac5-b2db-65c790d184a4">Shared</Record>
+    <Rights xmlns="4ffa91fb-a0ff-4ac5-b2db-65c790d184a4" xsi:nil="true"/>
+    <Document_x0020_Creation_x0020_Date xmlns="4ffa91fb-a0ff-4ac5-b2db-65c790d184a4">2020-03-02T17:17:22+00:00</Document_x0020_Creation_x0020_Date>
+    <EPA_x0020_Office xmlns="4ffa91fb-a0ff-4ac5-b2db-65c790d184a4" xsi:nil="true"/>
+    <Records_x0020_Status xmlns="5c765a16-8853-4f98-a815-3aaad8dda3d1">Pending</Records_x0020_Status>
+    <CategoryDescription xmlns="http://schemas.microsoft.com/sharepoint.v3" xsi:nil="true"/>
+    <Identifier xmlns="4ffa91fb-a0ff-4ac5-b2db-65c790d184a4" xsi:nil="true"/>
+    <_Coverage xmlns="http://schemas.microsoft.com/sharepoint/v3/fields" xsi:nil="true"/>
+    <Creator xmlns="4ffa91fb-a0ff-4ac5-b2db-65c790d184a4">
+      <UserInfo>
+        <DisplayName/>
+        <AccountId xsi:nil="true"/>
+        <AccountType/>
+      </UserInfo>
+    </Creator>
+    <EPA_x0020_Related_x0020_Documents xmlns="4ffa91fb-a0ff-4ac5-b2db-65c790d184a4" xsi:nil="true"/>
+    <EPA_x0020_Contributor xmlns="4ffa91fb-a0ff-4ac5-b2db-65c790d184a4">
+      <UserInfo>
+        <DisplayName/>
+        <AccountId xsi:nil="true"/>
+        <AccountType/>
+      </UserInfo>
+    </EPA_x0020_Contributor>
+    <TaxCatchAll xmlns="4ffa91fb-a0ff-4ac5-b2db-65c790d184a4"/>
+  </documentManagement>
+</p:properties>
+</file>
+
 <file path=customXml/item4.xml><?xml version="1.0" encoding="utf-8"?>
 <?mso-contentType ?>
-<SharedContentType xmlns="Microsoft.SharePoint.Taxonomy.ContentTypeSync" SourceId="29f62856-1543-49d4-a736-4569d363f533" ContentTypeId="0x0101" PreviousValue="false"/>
+<FormTemplates xmlns="http://schemas.microsoft.com/sharepoint/v3/contenttype/forms">
+  <Display>DocumentLibraryForm</Display>
+  <Edit>DocumentLibraryForm</Edit>
+  <New>DocumentLibraryForm</New>
+</FormTemplates>
 </file>
 
 <file path=customXml/itemProps1.xml><?xml version="1.0" encoding="utf-8"?>
-<ds:datastoreItem xmlns:ds="http://schemas.openxmlformats.org/officeDocument/2006/customXml" ds:itemID="{3E527ADC-4D27-4235-98E3-043AAE245D25}">
+<ds:datastoreItem xmlns:ds="http://schemas.openxmlformats.org/officeDocument/2006/customXml" ds:itemID="{AF98B62B-D5AD-4F69-9C7C-07ABDD8186E3}">
   <ds:schemaRefs>
-    <ds:schemaRef ds:uri="http://schemas.microsoft.com/sharepoint/v3/contenttype/forms"/>
+    <ds:schemaRef ds:uri="Microsoft.SharePoint.Taxonomy.ContentTypeSync"/>
   </ds:schemaRefs>
 </ds:datastoreItem>
 </file>
 
 <file path=customXml/itemProps2.xml><?xml version="1.0" encoding="utf-8"?>
-<ds:datastoreItem xmlns:ds="http://schemas.openxmlformats.org/officeDocument/2006/customXml" ds:itemID="{4A8071CE-6AEC-40B9-85EA-6943EB56CA4E}">
-  <ds:schemaRefs>
-    <ds:schemaRef ds:uri="http://purl.org/dc/elements/1.1/"/>
-    <ds:schemaRef ds:uri="http://schemas.microsoft.com/office/2006/metadata/properties"/>
-    <ds:schemaRef ds:uri="http://schemas.microsoft.com/sharepoint/v3/fields"/>
-    <ds:schemaRef ds:uri="http://schemas.microsoft.com/sharepoint/v3"/>
-    <ds:schemaRef ds:uri="http://purl.org/dc/terms/"/>
-    <ds:schemaRef ds:uri="http://schemas.microsoft.com/office/infopath/2007/PartnerControls"/>
-    <ds:schemaRef ds:uri="http://schemas.openxmlformats.org/package/2006/metadata/core-properties"/>
-    <ds:schemaRef ds:uri="http://schemas.microsoft.com/office/2006/documentManagement/types"/>
-    <ds:schemaRef ds:uri="4ffa91fb-a0ff-4ac5-b2db-65c790d184a4"/>
-    <ds:schemaRef ds:uri="http://schemas.microsoft.com/sharepoint.v3"/>
-    <ds:schemaRef ds:uri="5c765a16-8853-4f98-a815-3aaad8dda3d1"/>
-    <ds:schemaRef ds:uri="c4f5f859-d02f-4748-a7f3-bb258078b539"/>
-    <ds:schemaRef ds:uri="http://www.w3.org/XML/1998/namespace"/>
-    <ds:schemaRef ds:uri="http://purl.org/dc/dcmitype/"/>
-  </ds:schemaRefs>
-</ds:datastoreItem>
-</file>
-
-<file path=customXml/itemProps3.xml><?xml version="1.0" encoding="utf-8"?>
 <ds:datastoreItem xmlns:ds="http://schemas.openxmlformats.org/officeDocument/2006/customXml" ds:itemID="{F70F6F5B-C7EB-42D7-BFBD-10B48900E7D2}">
   <ds:schemaRefs>
     <ds:schemaRef ds:uri="http://schemas.microsoft.com/office/2006/metadata/contentType"/>
@@ -6399,10 +8231,31 @@
 </ds:datastoreItem>
 </file>
 
+<file path=customXml/itemProps3.xml><?xml version="1.0" encoding="utf-8"?>
+<ds:datastoreItem xmlns:ds="http://schemas.openxmlformats.org/officeDocument/2006/customXml" ds:itemID="{4A8071CE-6AEC-40B9-85EA-6943EB56CA4E}">
+  <ds:schemaRefs>
+    <ds:schemaRef ds:uri="http://purl.org/dc/elements/1.1/"/>
+    <ds:schemaRef ds:uri="http://schemas.microsoft.com/office/2006/metadata/properties"/>
+    <ds:schemaRef ds:uri="http://schemas.microsoft.com/sharepoint/v3/fields"/>
+    <ds:schemaRef ds:uri="http://schemas.microsoft.com/sharepoint/v3"/>
+    <ds:schemaRef ds:uri="http://purl.org/dc/terms/"/>
+    <ds:schemaRef ds:uri="http://schemas.microsoft.com/office/infopath/2007/PartnerControls"/>
+    <ds:schemaRef ds:uri="http://schemas.openxmlformats.org/package/2006/metadata/core-properties"/>
+    <ds:schemaRef ds:uri="http://schemas.microsoft.com/office/2006/documentManagement/types"/>
+    <ds:schemaRef ds:uri="4ffa91fb-a0ff-4ac5-b2db-65c790d184a4"/>
+    <ds:schemaRef ds:uri="http://schemas.microsoft.com/sharepoint.v3"/>
+    <ds:schemaRef ds:uri="5c765a16-8853-4f98-a815-3aaad8dda3d1"/>
+    <ds:schemaRef ds:uri="c4f5f859-d02f-4748-a7f3-bb258078b539"/>
+    <ds:schemaRef ds:uri="http://www.w3.org/XML/1998/namespace"/>
+    <ds:schemaRef ds:uri="http://purl.org/dc/dcmitype/"/>
+  </ds:schemaRefs>
+</ds:datastoreItem>
+</file>
+
 <file path=customXml/itemProps4.xml><?xml version="1.0" encoding="utf-8"?>
-<ds:datastoreItem xmlns:ds="http://schemas.openxmlformats.org/officeDocument/2006/customXml" ds:itemID="{AF98B62B-D5AD-4F69-9C7C-07ABDD8186E3}">
+<ds:datastoreItem xmlns:ds="http://schemas.openxmlformats.org/officeDocument/2006/customXml" ds:itemID="{3E527ADC-4D27-4235-98E3-043AAE245D25}">
   <ds:schemaRefs>
-    <ds:schemaRef ds:uri="Microsoft.SharePoint.Taxonomy.ContentTypeSync"/>
+    <ds:schemaRef ds:uri="http://schemas.microsoft.com/sharepoint/v3/contenttype/forms"/>
   </ds:schemaRefs>
 </ds:datastoreItem>
 </file>
</xml_diff>